<commit_message>
Revert "Merge branch 'master' of https://github.com/skwls2087/itea"
This reverts commit 049fc122e95fafde6bdd4f8ec7b8e1779c20add1, reversing
changes made to 9b15a0ac4640ddc658f3ffac5d1c5906ed6949cd.
</commit_message>
<xml_diff>
--- a/추가자료/스토리보드/아이티어_스토리보드_나이수.pptx
+++ b/추가자료/스토리보드/아이티어_스토리보드_나이수.pptx
@@ -4,9 +4,6 @@
   <p:sldMasterIdLst>
     <p:sldMasterId id="2147483648" r:id="rId1"/>
   </p:sldMasterIdLst>
-  <p:notesMasterIdLst>
-    <p:notesMasterId r:id="rId8"/>
-  </p:notesMasterIdLst>
   <p:sldIdLst>
     <p:sldId id="280" r:id="rId2"/>
     <p:sldId id="281" r:id="rId3"/>
@@ -114,7 +111,7 @@
   </p:defaultTextStyle>
   <p:extLst>
     <p:ext uri="{EFAFB233-063F-42B5-8137-9DF3F51BA10A}">
-      <p15:sldGuideLst xmlns="" xmlns:p15="http://schemas.microsoft.com/office/powerpoint/2012/main">
+      <p15:sldGuideLst xmlns:p15="http://schemas.microsoft.com/office/powerpoint/2012/main" xmlns="">
         <p15:guide id="1" orient="horz" pos="2160">
           <p15:clr>
             <a:srgbClr val="A4A3A4"/>
@@ -129,353 +126,6 @@
     </p:ext>
   </p:extLst>
 </p:presentation>
-</file>
-
-<file path=ppt/notesMasters/notesMaster1.xml><?xml version="1.0" encoding="utf-8"?>
-<p:notesMaster xmlns:a="http://schemas.openxmlformats.org/drawingml/2006/main" xmlns:r="http://schemas.openxmlformats.org/officeDocument/2006/relationships" xmlns:p="http://schemas.openxmlformats.org/presentationml/2006/main">
-  <p:cSld>
-    <p:bg>
-      <p:bgRef idx="1001">
-        <a:schemeClr val="bg1"/>
-      </p:bgRef>
-    </p:bg>
-    <p:spTree>
-      <p:nvGrpSpPr>
-        <p:cNvPr id="1" name=""/>
-        <p:cNvGrpSpPr/>
-        <p:nvPr/>
-      </p:nvGrpSpPr>
-      <p:grpSpPr>
-        <a:xfrm>
-          <a:off x="0" y="0"/>
-          <a:ext cx="0" cy="0"/>
-          <a:chOff x="0" y="0"/>
-          <a:chExt cx="0" cy="0"/>
-        </a:xfrm>
-      </p:grpSpPr>
-      <p:sp>
-        <p:nvSpPr>
-          <p:cNvPr id="2" name="머리글 개체 틀 1"/>
-          <p:cNvSpPr>
-            <a:spLocks noGrp="1"/>
-          </p:cNvSpPr>
-          <p:nvPr>
-            <p:ph type="hdr" sz="quarter"/>
-          </p:nvPr>
-        </p:nvSpPr>
-        <p:spPr>
-          <a:xfrm>
-            <a:off x="0" y="0"/>
-            <a:ext cx="2971800" cy="457200"/>
-          </a:xfrm>
-          <a:prstGeom prst="rect">
-            <a:avLst/>
-          </a:prstGeom>
-        </p:spPr>
-        <p:txBody>
-          <a:bodyPr vert="horz" lIns="91440" tIns="45720" rIns="91440" bIns="45720" rtlCol="0"/>
-          <a:lstStyle>
-            <a:lvl1pPr algn="l">
-              <a:defRPr sz="1200"/>
-            </a:lvl1pPr>
-          </a:lstStyle>
-          <a:p>
-            <a:endParaRPr lang="ko-KR" altLang="en-US"/>
-          </a:p>
-        </p:txBody>
-      </p:sp>
-      <p:sp>
-        <p:nvSpPr>
-          <p:cNvPr id="3" name="날짜 개체 틀 2"/>
-          <p:cNvSpPr>
-            <a:spLocks noGrp="1"/>
-          </p:cNvSpPr>
-          <p:nvPr>
-            <p:ph type="dt" idx="1"/>
-          </p:nvPr>
-        </p:nvSpPr>
-        <p:spPr>
-          <a:xfrm>
-            <a:off x="3884613" y="0"/>
-            <a:ext cx="2971800" cy="457200"/>
-          </a:xfrm>
-          <a:prstGeom prst="rect">
-            <a:avLst/>
-          </a:prstGeom>
-        </p:spPr>
-        <p:txBody>
-          <a:bodyPr vert="horz" lIns="91440" tIns="45720" rIns="91440" bIns="45720" rtlCol="0"/>
-          <a:lstStyle>
-            <a:lvl1pPr algn="r">
-              <a:defRPr sz="1200"/>
-            </a:lvl1pPr>
-          </a:lstStyle>
-          <a:p>
-            <a:fld id="{5F755DE1-EA75-4A2D-9B9F-9C65C3EA48FD}" type="datetimeFigureOut">
-              <a:rPr lang="ko-KR" altLang="en-US" smtClean="0"/>
-              <a:t>2020-06-22</a:t>
-            </a:fld>
-            <a:endParaRPr lang="ko-KR" altLang="en-US"/>
-          </a:p>
-        </p:txBody>
-      </p:sp>
-      <p:sp>
-        <p:nvSpPr>
-          <p:cNvPr id="4" name="슬라이드 이미지 개체 틀 3"/>
-          <p:cNvSpPr>
-            <a:spLocks noGrp="1" noRot="1" noChangeAspect="1"/>
-          </p:cNvSpPr>
-          <p:nvPr>
-            <p:ph type="sldImg" idx="2"/>
-          </p:nvPr>
-        </p:nvSpPr>
-        <p:spPr>
-          <a:xfrm>
-            <a:off x="381000" y="685800"/>
-            <a:ext cx="6096000" cy="3429000"/>
-          </a:xfrm>
-          <a:prstGeom prst="rect">
-            <a:avLst/>
-          </a:prstGeom>
-          <a:noFill/>
-          <a:ln w="12700">
-            <a:solidFill>
-              <a:prstClr val="black"/>
-            </a:solidFill>
-          </a:ln>
-        </p:spPr>
-        <p:txBody>
-          <a:bodyPr vert="horz" lIns="91440" tIns="45720" rIns="91440" bIns="45720" rtlCol="0" anchor="ctr"/>
-          <a:lstStyle/>
-          <a:p>
-            <a:endParaRPr lang="ko-KR" altLang="en-US"/>
-          </a:p>
-        </p:txBody>
-      </p:sp>
-      <p:sp>
-        <p:nvSpPr>
-          <p:cNvPr id="5" name="슬라이드 노트 개체 틀 4"/>
-          <p:cNvSpPr>
-            <a:spLocks noGrp="1"/>
-          </p:cNvSpPr>
-          <p:nvPr>
-            <p:ph type="body" sz="quarter" idx="3"/>
-          </p:nvPr>
-        </p:nvSpPr>
-        <p:spPr>
-          <a:xfrm>
-            <a:off x="685800" y="4343400"/>
-            <a:ext cx="5486400" cy="4114800"/>
-          </a:xfrm>
-          <a:prstGeom prst="rect">
-            <a:avLst/>
-          </a:prstGeom>
-        </p:spPr>
-        <p:txBody>
-          <a:bodyPr vert="horz" lIns="91440" tIns="45720" rIns="91440" bIns="45720" rtlCol="0">
-            <a:normAutofit/>
-          </a:bodyPr>
-          <a:lstStyle/>
-          <a:p>
-            <a:pPr lvl="0"/>
-            <a:r>
-              <a:rPr lang="ko-KR" altLang="en-US" smtClean="0"/>
-              <a:t>마스터 텍스트 스타일을 편집합니다</a:t>
-            </a:r>
-          </a:p>
-          <a:p>
-            <a:pPr lvl="1"/>
-            <a:r>
-              <a:rPr lang="ko-KR" altLang="en-US" smtClean="0"/>
-              <a:t>둘째 수준</a:t>
-            </a:r>
-          </a:p>
-          <a:p>
-            <a:pPr lvl="2"/>
-            <a:r>
-              <a:rPr lang="ko-KR" altLang="en-US" smtClean="0"/>
-              <a:t>셋째 수준</a:t>
-            </a:r>
-          </a:p>
-          <a:p>
-            <a:pPr lvl="3"/>
-            <a:r>
-              <a:rPr lang="ko-KR" altLang="en-US" smtClean="0"/>
-              <a:t>넷째 수준</a:t>
-            </a:r>
-          </a:p>
-          <a:p>
-            <a:pPr lvl="4"/>
-            <a:r>
-              <a:rPr lang="ko-KR" altLang="en-US" smtClean="0"/>
-              <a:t>다섯째 수준</a:t>
-            </a:r>
-            <a:endParaRPr lang="ko-KR" altLang="en-US"/>
-          </a:p>
-        </p:txBody>
-      </p:sp>
-      <p:sp>
-        <p:nvSpPr>
-          <p:cNvPr id="6" name="바닥글 개체 틀 5"/>
-          <p:cNvSpPr>
-            <a:spLocks noGrp="1"/>
-          </p:cNvSpPr>
-          <p:nvPr>
-            <p:ph type="ftr" sz="quarter" idx="4"/>
-          </p:nvPr>
-        </p:nvSpPr>
-        <p:spPr>
-          <a:xfrm>
-            <a:off x="0" y="8685213"/>
-            <a:ext cx="2971800" cy="457200"/>
-          </a:xfrm>
-          <a:prstGeom prst="rect">
-            <a:avLst/>
-          </a:prstGeom>
-        </p:spPr>
-        <p:txBody>
-          <a:bodyPr vert="horz" lIns="91440" tIns="45720" rIns="91440" bIns="45720" rtlCol="0" anchor="b"/>
-          <a:lstStyle>
-            <a:lvl1pPr algn="l">
-              <a:defRPr sz="1200"/>
-            </a:lvl1pPr>
-          </a:lstStyle>
-          <a:p>
-            <a:endParaRPr lang="ko-KR" altLang="en-US"/>
-          </a:p>
-        </p:txBody>
-      </p:sp>
-      <p:sp>
-        <p:nvSpPr>
-          <p:cNvPr id="7" name="슬라이드 번호 개체 틀 6"/>
-          <p:cNvSpPr>
-            <a:spLocks noGrp="1"/>
-          </p:cNvSpPr>
-          <p:nvPr>
-            <p:ph type="sldNum" sz="quarter" idx="5"/>
-          </p:nvPr>
-        </p:nvSpPr>
-        <p:spPr>
-          <a:xfrm>
-            <a:off x="3884613" y="8685213"/>
-            <a:ext cx="2971800" cy="457200"/>
-          </a:xfrm>
-          <a:prstGeom prst="rect">
-            <a:avLst/>
-          </a:prstGeom>
-        </p:spPr>
-        <p:txBody>
-          <a:bodyPr vert="horz" lIns="91440" tIns="45720" rIns="91440" bIns="45720" rtlCol="0" anchor="b"/>
-          <a:lstStyle>
-            <a:lvl1pPr algn="r">
-              <a:defRPr sz="1200"/>
-            </a:lvl1pPr>
-          </a:lstStyle>
-          <a:p>
-            <a:fld id="{DFC4F0A6-33C0-4BAA-B4AA-A3DF30D28BD1}" type="slidenum">
-              <a:rPr lang="ko-KR" altLang="en-US" smtClean="0"/>
-              <a:t>‹#›</a:t>
-            </a:fld>
-            <a:endParaRPr lang="ko-KR" altLang="en-US"/>
-          </a:p>
-        </p:txBody>
-      </p:sp>
-    </p:spTree>
-  </p:cSld>
-  <p:clrMap bg1="lt1" tx1="dk1" bg2="lt2" tx2="dk2" accent1="accent1" accent2="accent2" accent3="accent3" accent4="accent4" accent5="accent5" accent6="accent6" hlink="hlink" folHlink="folHlink"/>
-  <p:notesStyle>
-    <a:lvl1pPr marL="0" algn="l" defTabSz="914400" rtl="0" eaLnBrk="1" latinLnBrk="1" hangingPunct="1">
-      <a:defRPr sz="1200" kern="1200">
-        <a:solidFill>
-          <a:schemeClr val="tx1"/>
-        </a:solidFill>
-        <a:latin typeface="+mn-lt"/>
-        <a:ea typeface="+mn-ea"/>
-        <a:cs typeface="+mn-cs"/>
-      </a:defRPr>
-    </a:lvl1pPr>
-    <a:lvl2pPr marL="457200" algn="l" defTabSz="914400" rtl="0" eaLnBrk="1" latinLnBrk="1" hangingPunct="1">
-      <a:defRPr sz="1200" kern="1200">
-        <a:solidFill>
-          <a:schemeClr val="tx1"/>
-        </a:solidFill>
-        <a:latin typeface="+mn-lt"/>
-        <a:ea typeface="+mn-ea"/>
-        <a:cs typeface="+mn-cs"/>
-      </a:defRPr>
-    </a:lvl2pPr>
-    <a:lvl3pPr marL="914400" algn="l" defTabSz="914400" rtl="0" eaLnBrk="1" latinLnBrk="1" hangingPunct="1">
-      <a:defRPr sz="1200" kern="1200">
-        <a:solidFill>
-          <a:schemeClr val="tx1"/>
-        </a:solidFill>
-        <a:latin typeface="+mn-lt"/>
-        <a:ea typeface="+mn-ea"/>
-        <a:cs typeface="+mn-cs"/>
-      </a:defRPr>
-    </a:lvl3pPr>
-    <a:lvl4pPr marL="1371600" algn="l" defTabSz="914400" rtl="0" eaLnBrk="1" latinLnBrk="1" hangingPunct="1">
-      <a:defRPr sz="1200" kern="1200">
-        <a:solidFill>
-          <a:schemeClr val="tx1"/>
-        </a:solidFill>
-        <a:latin typeface="+mn-lt"/>
-        <a:ea typeface="+mn-ea"/>
-        <a:cs typeface="+mn-cs"/>
-      </a:defRPr>
-    </a:lvl4pPr>
-    <a:lvl5pPr marL="1828800" algn="l" defTabSz="914400" rtl="0" eaLnBrk="1" latinLnBrk="1" hangingPunct="1">
-      <a:defRPr sz="1200" kern="1200">
-        <a:solidFill>
-          <a:schemeClr val="tx1"/>
-        </a:solidFill>
-        <a:latin typeface="+mn-lt"/>
-        <a:ea typeface="+mn-ea"/>
-        <a:cs typeface="+mn-cs"/>
-      </a:defRPr>
-    </a:lvl5pPr>
-    <a:lvl6pPr marL="2286000" algn="l" defTabSz="914400" rtl="0" eaLnBrk="1" latinLnBrk="1" hangingPunct="1">
-      <a:defRPr sz="1200" kern="1200">
-        <a:solidFill>
-          <a:schemeClr val="tx1"/>
-        </a:solidFill>
-        <a:latin typeface="+mn-lt"/>
-        <a:ea typeface="+mn-ea"/>
-        <a:cs typeface="+mn-cs"/>
-      </a:defRPr>
-    </a:lvl6pPr>
-    <a:lvl7pPr marL="2743200" algn="l" defTabSz="914400" rtl="0" eaLnBrk="1" latinLnBrk="1" hangingPunct="1">
-      <a:defRPr sz="1200" kern="1200">
-        <a:solidFill>
-          <a:schemeClr val="tx1"/>
-        </a:solidFill>
-        <a:latin typeface="+mn-lt"/>
-        <a:ea typeface="+mn-ea"/>
-        <a:cs typeface="+mn-cs"/>
-      </a:defRPr>
-    </a:lvl7pPr>
-    <a:lvl8pPr marL="3200400" algn="l" defTabSz="914400" rtl="0" eaLnBrk="1" latinLnBrk="1" hangingPunct="1">
-      <a:defRPr sz="1200" kern="1200">
-        <a:solidFill>
-          <a:schemeClr val="tx1"/>
-        </a:solidFill>
-        <a:latin typeface="+mn-lt"/>
-        <a:ea typeface="+mn-ea"/>
-        <a:cs typeface="+mn-cs"/>
-      </a:defRPr>
-    </a:lvl8pPr>
-    <a:lvl9pPr marL="3657600" algn="l" defTabSz="914400" rtl="0" eaLnBrk="1" latinLnBrk="1" hangingPunct="1">
-      <a:defRPr sz="1200" kern="1200">
-        <a:solidFill>
-          <a:schemeClr val="tx1"/>
-        </a:solidFill>
-        <a:latin typeface="+mn-lt"/>
-        <a:ea typeface="+mn-ea"/>
-        <a:cs typeface="+mn-cs"/>
-      </a:defRPr>
-    </a:lvl9pPr>
-  </p:notesStyle>
-</p:notesMaster>
 </file>
 
 <file path=ppt/slideLayouts/slideLayout1.xml><?xml version="1.0" encoding="utf-8"?>
@@ -660,7 +310,7 @@
     </p:spTree>
     <p:extLst>
       <p:ext uri="{BB962C8B-B14F-4D97-AF65-F5344CB8AC3E}">
-        <p14:creationId xmlns="" xmlns:p14="http://schemas.microsoft.com/office/powerpoint/2010/main" val="3137131438"/>
+        <p14:creationId xmlns:p14="http://schemas.microsoft.com/office/powerpoint/2010/main" xmlns="" val="3137131438"/>
       </p:ext>
     </p:extLst>
   </p:cSld>
@@ -830,7 +480,7 @@
     </p:spTree>
     <p:extLst>
       <p:ext uri="{BB962C8B-B14F-4D97-AF65-F5344CB8AC3E}">
-        <p14:creationId xmlns="" xmlns:p14="http://schemas.microsoft.com/office/powerpoint/2010/main" val="2009613086"/>
+        <p14:creationId xmlns:p14="http://schemas.microsoft.com/office/powerpoint/2010/main" xmlns="" val="2009613086"/>
       </p:ext>
     </p:extLst>
   </p:cSld>
@@ -1010,7 +660,7 @@
     </p:spTree>
     <p:extLst>
       <p:ext uri="{BB962C8B-B14F-4D97-AF65-F5344CB8AC3E}">
-        <p14:creationId xmlns="" xmlns:p14="http://schemas.microsoft.com/office/powerpoint/2010/main" val="2597636882"/>
+        <p14:creationId xmlns:p14="http://schemas.microsoft.com/office/powerpoint/2010/main" xmlns="" val="2597636882"/>
       </p:ext>
     </p:extLst>
   </p:cSld>
@@ -1180,7 +830,7 @@
     </p:spTree>
     <p:extLst>
       <p:ext uri="{BB962C8B-B14F-4D97-AF65-F5344CB8AC3E}">
-        <p14:creationId xmlns="" xmlns:p14="http://schemas.microsoft.com/office/powerpoint/2010/main" val="2723585880"/>
+        <p14:creationId xmlns:p14="http://schemas.microsoft.com/office/powerpoint/2010/main" xmlns="" val="2723585880"/>
       </p:ext>
     </p:extLst>
   </p:cSld>
@@ -1427,7 +1077,7 @@
     </p:spTree>
     <p:extLst>
       <p:ext uri="{BB962C8B-B14F-4D97-AF65-F5344CB8AC3E}">
-        <p14:creationId xmlns="" xmlns:p14="http://schemas.microsoft.com/office/powerpoint/2010/main" val="3951154163"/>
+        <p14:creationId xmlns:p14="http://schemas.microsoft.com/office/powerpoint/2010/main" xmlns="" val="3951154163"/>
       </p:ext>
     </p:extLst>
   </p:cSld>
@@ -1658,7 +1308,7 @@
     </p:spTree>
     <p:extLst>
       <p:ext uri="{BB962C8B-B14F-4D97-AF65-F5344CB8AC3E}">
-        <p14:creationId xmlns="" xmlns:p14="http://schemas.microsoft.com/office/powerpoint/2010/main" val="1010690246"/>
+        <p14:creationId xmlns:p14="http://schemas.microsoft.com/office/powerpoint/2010/main" xmlns="" val="1010690246"/>
       </p:ext>
     </p:extLst>
   </p:cSld>
@@ -2024,7 +1674,7 @@
     </p:spTree>
     <p:extLst>
       <p:ext uri="{BB962C8B-B14F-4D97-AF65-F5344CB8AC3E}">
-        <p14:creationId xmlns="" xmlns:p14="http://schemas.microsoft.com/office/powerpoint/2010/main" val="1992279787"/>
+        <p14:creationId xmlns:p14="http://schemas.microsoft.com/office/powerpoint/2010/main" xmlns="" val="1992279787"/>
       </p:ext>
     </p:extLst>
   </p:cSld>
@@ -2143,7 +1793,7 @@
     </p:spTree>
     <p:extLst>
       <p:ext uri="{BB962C8B-B14F-4D97-AF65-F5344CB8AC3E}">
-        <p14:creationId xmlns="" xmlns:p14="http://schemas.microsoft.com/office/powerpoint/2010/main" val="2734983826"/>
+        <p14:creationId xmlns:p14="http://schemas.microsoft.com/office/powerpoint/2010/main" xmlns="" val="2734983826"/>
       </p:ext>
     </p:extLst>
   </p:cSld>
@@ -2240,7 +1890,7 @@
     </p:spTree>
     <p:extLst>
       <p:ext uri="{BB962C8B-B14F-4D97-AF65-F5344CB8AC3E}">
-        <p14:creationId xmlns="" xmlns:p14="http://schemas.microsoft.com/office/powerpoint/2010/main" val="3568537413"/>
+        <p14:creationId xmlns:p14="http://schemas.microsoft.com/office/powerpoint/2010/main" xmlns="" val="3568537413"/>
       </p:ext>
     </p:extLst>
   </p:cSld>
@@ -2517,7 +2167,7 @@
     </p:spTree>
     <p:extLst>
       <p:ext uri="{BB962C8B-B14F-4D97-AF65-F5344CB8AC3E}">
-        <p14:creationId xmlns="" xmlns:p14="http://schemas.microsoft.com/office/powerpoint/2010/main" val="3495782869"/>
+        <p14:creationId xmlns:p14="http://schemas.microsoft.com/office/powerpoint/2010/main" xmlns="" val="3495782869"/>
       </p:ext>
     </p:extLst>
   </p:cSld>
@@ -2771,7 +2421,7 @@
     </p:spTree>
     <p:extLst>
       <p:ext uri="{BB962C8B-B14F-4D97-AF65-F5344CB8AC3E}">
-        <p14:creationId xmlns="" xmlns:p14="http://schemas.microsoft.com/office/powerpoint/2010/main" val="3048878555"/>
+        <p14:creationId xmlns:p14="http://schemas.microsoft.com/office/powerpoint/2010/main" xmlns="" val="3048878555"/>
       </p:ext>
     </p:extLst>
   </p:cSld>
@@ -3020,7 +2670,7 @@
     </p:spTree>
     <p:extLst>
       <p:ext uri="{BB962C8B-B14F-4D97-AF65-F5344CB8AC3E}">
-        <p14:creationId xmlns="" xmlns:p14="http://schemas.microsoft.com/office/powerpoint/2010/main" val="3949528538"/>
+        <p14:creationId xmlns:p14="http://schemas.microsoft.com/office/powerpoint/2010/main" xmlns="" val="3949528538"/>
       </p:ext>
     </p:extLst>
   </p:cSld>
@@ -3343,7 +2993,7 @@
           <p:cNvPr id="4" name="TextBox 3">
             <a:extLst>
               <a:ext uri="{FF2B5EF4-FFF2-40B4-BE49-F238E27FC236}">
-                <a16:creationId xmlns="" xmlns:a16="http://schemas.microsoft.com/office/drawing/2014/main" id="{48ED4E7C-4355-40F7-8F11-F7CA206777A9}"/>
+                <a16:creationId xmlns:a16="http://schemas.microsoft.com/office/drawing/2014/main" xmlns="" id="{48ED4E7C-4355-40F7-8F11-F7CA206777A9}"/>
               </a:ext>
             </a:extLst>
           </p:cNvPr>
@@ -3398,7 +3048,7 @@
           <p:cNvPr id="5" name="TextBox 4">
             <a:extLst>
               <a:ext uri="{FF2B5EF4-FFF2-40B4-BE49-F238E27FC236}">
-                <a16:creationId xmlns="" xmlns:a16="http://schemas.microsoft.com/office/drawing/2014/main" id="{9374B7AA-189F-4285-A09F-5FEFDB0385E8}"/>
+                <a16:creationId xmlns:a16="http://schemas.microsoft.com/office/drawing/2014/main" xmlns="" id="{9374B7AA-189F-4285-A09F-5FEFDB0385E8}"/>
               </a:ext>
             </a:extLst>
           </p:cNvPr>
@@ -3440,7 +3090,7 @@
           <p:cNvPr id="6" name="TextBox 5">
             <a:extLst>
               <a:ext uri="{FF2B5EF4-FFF2-40B4-BE49-F238E27FC236}">
-                <a16:creationId xmlns="" xmlns:a16="http://schemas.microsoft.com/office/drawing/2014/main" id="{0160EFF4-D0E4-4B57-9ABE-9B59EC33FB95}"/>
+                <a16:creationId xmlns:a16="http://schemas.microsoft.com/office/drawing/2014/main" xmlns="" id="{0160EFF4-D0E4-4B57-9ABE-9B59EC33FB95}"/>
               </a:ext>
             </a:extLst>
           </p:cNvPr>
@@ -3620,7 +3270,7 @@
     </p:spTree>
     <p:extLst>
       <p:ext uri="{BB962C8B-B14F-4D97-AF65-F5344CB8AC3E}">
-        <p14:creationId xmlns="" xmlns:p14="http://schemas.microsoft.com/office/powerpoint/2010/main" val="2221904889"/>
+        <p14:creationId xmlns:p14="http://schemas.microsoft.com/office/powerpoint/2010/main" xmlns="" val="2221904889"/>
       </p:ext>
     </p:extLst>
   </p:cSld>
@@ -3659,7 +3309,7 @@
           <p:cNvPr id="2" name="TextBox 1">
             <a:extLst>
               <a:ext uri="{FF2B5EF4-FFF2-40B4-BE49-F238E27FC236}">
-                <a16:creationId xmlns="" xmlns:a16="http://schemas.microsoft.com/office/drawing/2014/main" id="{D064B8B6-D904-458D-AD49-1F72E97F5E9D}"/>
+                <a16:creationId xmlns:a16="http://schemas.microsoft.com/office/drawing/2014/main" xmlns="" id="{D064B8B6-D904-458D-AD49-1F72E97F5E9D}"/>
               </a:ext>
             </a:extLst>
           </p:cNvPr>
@@ -3701,7 +3351,7 @@
           <p:cNvPr id="3" name="직사각형 2">
             <a:extLst>
               <a:ext uri="{FF2B5EF4-FFF2-40B4-BE49-F238E27FC236}">
-                <a16:creationId xmlns="" xmlns:a16="http://schemas.microsoft.com/office/drawing/2014/main" id="{99FAF754-B4BC-432A-837F-432597B71729}"/>
+                <a16:creationId xmlns:a16="http://schemas.microsoft.com/office/drawing/2014/main" xmlns="" id="{99FAF754-B4BC-432A-837F-432597B71729}"/>
               </a:ext>
             </a:extLst>
           </p:cNvPr>
@@ -3772,7 +3422,7 @@
           <p:cNvPr id="8" name="직사각형 7">
             <a:extLst>
               <a:ext uri="{FF2B5EF4-FFF2-40B4-BE49-F238E27FC236}">
-                <a16:creationId xmlns="" xmlns:a16="http://schemas.microsoft.com/office/drawing/2014/main" id="{2D4FD220-A575-490D-91AD-62C8CF51B637}"/>
+                <a16:creationId xmlns:a16="http://schemas.microsoft.com/office/drawing/2014/main" xmlns="" id="{2D4FD220-A575-490D-91AD-62C8CF51B637}"/>
               </a:ext>
             </a:extLst>
           </p:cNvPr>
@@ -3843,7 +3493,7 @@
           <p:cNvPr id="9" name="직사각형 8">
             <a:extLst>
               <a:ext uri="{FF2B5EF4-FFF2-40B4-BE49-F238E27FC236}">
-                <a16:creationId xmlns="" xmlns:a16="http://schemas.microsoft.com/office/drawing/2014/main" id="{3DB692EA-E9FD-421F-B296-48DC0D5A8784}"/>
+                <a16:creationId xmlns:a16="http://schemas.microsoft.com/office/drawing/2014/main" xmlns="" id="{3DB692EA-E9FD-421F-B296-48DC0D5A8784}"/>
               </a:ext>
             </a:extLst>
           </p:cNvPr>
@@ -3921,7 +3571,7 @@
           <p:cNvPr id="10" name="직사각형 9">
             <a:extLst>
               <a:ext uri="{FF2B5EF4-FFF2-40B4-BE49-F238E27FC236}">
-                <a16:creationId xmlns="" xmlns:a16="http://schemas.microsoft.com/office/drawing/2014/main" id="{5265ABC7-3053-44F9-8C45-6A1A33067425}"/>
+                <a16:creationId xmlns:a16="http://schemas.microsoft.com/office/drawing/2014/main" xmlns="" id="{5265ABC7-3053-44F9-8C45-6A1A33067425}"/>
               </a:ext>
             </a:extLst>
           </p:cNvPr>
@@ -4012,7 +3662,7 @@
           <p:cNvPr id="12" name="직사각형 11">
             <a:extLst>
               <a:ext uri="{FF2B5EF4-FFF2-40B4-BE49-F238E27FC236}">
-                <a16:creationId xmlns="" xmlns:a16="http://schemas.microsoft.com/office/drawing/2014/main" id="{6C642EC5-5747-4A71-8AD7-84D98850FDDD}"/>
+                <a16:creationId xmlns:a16="http://schemas.microsoft.com/office/drawing/2014/main" xmlns="" id="{6C642EC5-5747-4A71-8AD7-84D98850FDDD}"/>
               </a:ext>
             </a:extLst>
           </p:cNvPr>
@@ -4080,7 +3730,7 @@
           <p:cNvPr id="13" name="직사각형 12">
             <a:extLst>
               <a:ext uri="{FF2B5EF4-FFF2-40B4-BE49-F238E27FC236}">
-                <a16:creationId xmlns="" xmlns:a16="http://schemas.microsoft.com/office/drawing/2014/main" id="{6701C698-CB94-4DCE-BE98-B40FD4126801}"/>
+                <a16:creationId xmlns:a16="http://schemas.microsoft.com/office/drawing/2014/main" xmlns="" id="{6701C698-CB94-4DCE-BE98-B40FD4126801}"/>
               </a:ext>
             </a:extLst>
           </p:cNvPr>
@@ -4151,7 +3801,7 @@
           <p:cNvPr id="14" name="직사각형 13">
             <a:extLst>
               <a:ext uri="{FF2B5EF4-FFF2-40B4-BE49-F238E27FC236}">
-                <a16:creationId xmlns="" xmlns:a16="http://schemas.microsoft.com/office/drawing/2014/main" id="{289FC84F-A1A9-4352-9986-B557DD857895}"/>
+                <a16:creationId xmlns:a16="http://schemas.microsoft.com/office/drawing/2014/main" xmlns="" id="{289FC84F-A1A9-4352-9986-B557DD857895}"/>
               </a:ext>
             </a:extLst>
           </p:cNvPr>
@@ -4223,7 +3873,7 @@
           <p:cNvPr id="21" name="직선 화살표 연결선 20">
             <a:extLst>
               <a:ext uri="{FF2B5EF4-FFF2-40B4-BE49-F238E27FC236}">
-                <a16:creationId xmlns="" xmlns:a16="http://schemas.microsoft.com/office/drawing/2014/main" id="{718589C5-D047-466E-89E6-290857963614}"/>
+                <a16:creationId xmlns:a16="http://schemas.microsoft.com/office/drawing/2014/main" xmlns="" id="{718589C5-D047-466E-89E6-290857963614}"/>
               </a:ext>
             </a:extLst>
           </p:cNvPr>
@@ -4269,7 +3919,7 @@
           <p:cNvPr id="25" name="직선 화살표 연결선 24">
             <a:extLst>
               <a:ext uri="{FF2B5EF4-FFF2-40B4-BE49-F238E27FC236}">
-                <a16:creationId xmlns="" xmlns:a16="http://schemas.microsoft.com/office/drawing/2014/main" id="{81173D20-A477-4372-8215-B161833BD3A6}"/>
+                <a16:creationId xmlns:a16="http://schemas.microsoft.com/office/drawing/2014/main" xmlns="" id="{81173D20-A477-4372-8215-B161833BD3A6}"/>
               </a:ext>
             </a:extLst>
           </p:cNvPr>
@@ -4316,7 +3966,7 @@
           <p:cNvPr id="28" name="직선 화살표 연결선 27">
             <a:extLst>
               <a:ext uri="{FF2B5EF4-FFF2-40B4-BE49-F238E27FC236}">
-                <a16:creationId xmlns="" xmlns:a16="http://schemas.microsoft.com/office/drawing/2014/main" id="{2FC1DCDB-B04F-4581-AB1A-3A3A823B9BE9}"/>
+                <a16:creationId xmlns:a16="http://schemas.microsoft.com/office/drawing/2014/main" xmlns="" id="{2FC1DCDB-B04F-4581-AB1A-3A3A823B9BE9}"/>
               </a:ext>
             </a:extLst>
           </p:cNvPr>
@@ -4363,7 +4013,7 @@
           <p:cNvPr id="31" name="직선 화살표 연결선 30">
             <a:extLst>
               <a:ext uri="{FF2B5EF4-FFF2-40B4-BE49-F238E27FC236}">
-                <a16:creationId xmlns="" xmlns:a16="http://schemas.microsoft.com/office/drawing/2014/main" id="{F7DBD45C-A386-4C4D-A94F-C56D145F09CB}"/>
+                <a16:creationId xmlns:a16="http://schemas.microsoft.com/office/drawing/2014/main" xmlns="" id="{F7DBD45C-A386-4C4D-A94F-C56D145F09CB}"/>
               </a:ext>
             </a:extLst>
           </p:cNvPr>
@@ -4410,7 +4060,7 @@
           <p:cNvPr id="37" name="직선 화살표 연결선 36">
             <a:extLst>
               <a:ext uri="{FF2B5EF4-FFF2-40B4-BE49-F238E27FC236}">
-                <a16:creationId xmlns="" xmlns:a16="http://schemas.microsoft.com/office/drawing/2014/main" id="{CB8D4502-2604-4D11-B6D8-424AE1D9F65D}"/>
+                <a16:creationId xmlns:a16="http://schemas.microsoft.com/office/drawing/2014/main" xmlns="" id="{CB8D4502-2604-4D11-B6D8-424AE1D9F65D}"/>
               </a:ext>
             </a:extLst>
           </p:cNvPr>
@@ -4457,7 +4107,7 @@
           <p:cNvPr id="39" name="직선 화살표 연결선 38">
             <a:extLst>
               <a:ext uri="{FF2B5EF4-FFF2-40B4-BE49-F238E27FC236}">
-                <a16:creationId xmlns="" xmlns:a16="http://schemas.microsoft.com/office/drawing/2014/main" id="{D20CE891-F094-43B7-99EC-FF92DE08F2E7}"/>
+                <a16:creationId xmlns:a16="http://schemas.microsoft.com/office/drawing/2014/main" xmlns="" id="{D20CE891-F094-43B7-99EC-FF92DE08F2E7}"/>
               </a:ext>
             </a:extLst>
           </p:cNvPr>
@@ -4504,7 +4154,7 @@
           <p:cNvPr id="56" name="직사각형 55">
             <a:extLst>
               <a:ext uri="{FF2B5EF4-FFF2-40B4-BE49-F238E27FC236}">
-                <a16:creationId xmlns="" xmlns:a16="http://schemas.microsoft.com/office/drawing/2014/main" id="{F89E671B-8BE7-4143-8225-2C0E515530DA}"/>
+                <a16:creationId xmlns:a16="http://schemas.microsoft.com/office/drawing/2014/main" xmlns="" id="{F89E671B-8BE7-4143-8225-2C0E515530DA}"/>
               </a:ext>
             </a:extLst>
           </p:cNvPr>
@@ -4586,7 +4236,7 @@
           <p:cNvPr id="57" name="직사각형 56">
             <a:extLst>
               <a:ext uri="{FF2B5EF4-FFF2-40B4-BE49-F238E27FC236}">
-                <a16:creationId xmlns="" xmlns:a16="http://schemas.microsoft.com/office/drawing/2014/main" id="{32A7F4AD-C634-4B0C-868A-EC703577CE09}"/>
+                <a16:creationId xmlns:a16="http://schemas.microsoft.com/office/drawing/2014/main" xmlns="" id="{32A7F4AD-C634-4B0C-868A-EC703577CE09}"/>
               </a:ext>
             </a:extLst>
           </p:cNvPr>
@@ -4658,7 +4308,7 @@
           <p:cNvPr id="58" name="직사각형 57">
             <a:extLst>
               <a:ext uri="{FF2B5EF4-FFF2-40B4-BE49-F238E27FC236}">
-                <a16:creationId xmlns="" xmlns:a16="http://schemas.microsoft.com/office/drawing/2014/main" id="{5F36A5FE-E217-449C-B093-21117195B99E}"/>
+                <a16:creationId xmlns:a16="http://schemas.microsoft.com/office/drawing/2014/main" xmlns="" id="{5F36A5FE-E217-449C-B093-21117195B99E}"/>
               </a:ext>
             </a:extLst>
           </p:cNvPr>
@@ -4737,7 +4387,7 @@
           <p:cNvPr id="59" name="직사각형 58">
             <a:extLst>
               <a:ext uri="{FF2B5EF4-FFF2-40B4-BE49-F238E27FC236}">
-                <a16:creationId xmlns="" xmlns:a16="http://schemas.microsoft.com/office/drawing/2014/main" id="{9E62AD77-2F65-430D-94B9-107AE6889B46}"/>
+                <a16:creationId xmlns:a16="http://schemas.microsoft.com/office/drawing/2014/main" xmlns="" id="{9E62AD77-2F65-430D-94B9-107AE6889B46}"/>
               </a:ext>
             </a:extLst>
           </p:cNvPr>
@@ -4826,7 +4476,7 @@
           <p:cNvPr id="60" name="직선 화살표 연결선 59">
             <a:extLst>
               <a:ext uri="{FF2B5EF4-FFF2-40B4-BE49-F238E27FC236}">
-                <a16:creationId xmlns="" xmlns:a16="http://schemas.microsoft.com/office/drawing/2014/main" id="{D80358EB-9E1E-4662-AF62-918453A10D18}"/>
+                <a16:creationId xmlns:a16="http://schemas.microsoft.com/office/drawing/2014/main" xmlns="" id="{D80358EB-9E1E-4662-AF62-918453A10D18}"/>
               </a:ext>
             </a:extLst>
           </p:cNvPr>
@@ -4873,7 +4523,7 @@
           <p:cNvPr id="63" name="직선 화살표 연결선 62">
             <a:extLst>
               <a:ext uri="{FF2B5EF4-FFF2-40B4-BE49-F238E27FC236}">
-                <a16:creationId xmlns="" xmlns:a16="http://schemas.microsoft.com/office/drawing/2014/main" id="{FBDE1DCB-DD30-4158-BC2B-331F9564C0EC}"/>
+                <a16:creationId xmlns:a16="http://schemas.microsoft.com/office/drawing/2014/main" xmlns="" id="{FBDE1DCB-DD30-4158-BC2B-331F9564C0EC}"/>
               </a:ext>
             </a:extLst>
           </p:cNvPr>
@@ -4920,7 +4570,7 @@
           <p:cNvPr id="66" name="직선 화살표 연결선 65">
             <a:extLst>
               <a:ext uri="{FF2B5EF4-FFF2-40B4-BE49-F238E27FC236}">
-                <a16:creationId xmlns="" xmlns:a16="http://schemas.microsoft.com/office/drawing/2014/main" id="{6F197978-41CC-4DDA-8D32-C272057E625A}"/>
+                <a16:creationId xmlns:a16="http://schemas.microsoft.com/office/drawing/2014/main" xmlns="" id="{6F197978-41CC-4DDA-8D32-C272057E625A}"/>
               </a:ext>
             </a:extLst>
           </p:cNvPr>
@@ -4967,7 +4617,7 @@
           <p:cNvPr id="69" name="직선 화살표 연결선 68">
             <a:extLst>
               <a:ext uri="{FF2B5EF4-FFF2-40B4-BE49-F238E27FC236}">
-                <a16:creationId xmlns="" xmlns:a16="http://schemas.microsoft.com/office/drawing/2014/main" id="{5633B058-DA9D-438C-B918-956351C1EC05}"/>
+                <a16:creationId xmlns:a16="http://schemas.microsoft.com/office/drawing/2014/main" xmlns="" id="{5633B058-DA9D-438C-B918-956351C1EC05}"/>
               </a:ext>
             </a:extLst>
           </p:cNvPr>
@@ -5014,7 +4664,7 @@
           <p:cNvPr id="72" name="직사각형 71">
             <a:extLst>
               <a:ext uri="{FF2B5EF4-FFF2-40B4-BE49-F238E27FC236}">
-                <a16:creationId xmlns="" xmlns:a16="http://schemas.microsoft.com/office/drawing/2014/main" id="{5054029D-5527-4E35-8C0B-00191575C9C2}"/>
+                <a16:creationId xmlns:a16="http://schemas.microsoft.com/office/drawing/2014/main" xmlns="" id="{5054029D-5527-4E35-8C0B-00191575C9C2}"/>
               </a:ext>
             </a:extLst>
           </p:cNvPr>
@@ -5086,7 +4736,7 @@
           <p:cNvPr id="73" name="직사각형 72">
             <a:extLst>
               <a:ext uri="{FF2B5EF4-FFF2-40B4-BE49-F238E27FC236}">
-                <a16:creationId xmlns="" xmlns:a16="http://schemas.microsoft.com/office/drawing/2014/main" id="{36BA1A80-115F-495F-92F6-122526F3160D}"/>
+                <a16:creationId xmlns:a16="http://schemas.microsoft.com/office/drawing/2014/main" xmlns="" id="{36BA1A80-115F-495F-92F6-122526F3160D}"/>
               </a:ext>
             </a:extLst>
           </p:cNvPr>
@@ -5158,7 +4808,7 @@
           <p:cNvPr id="74" name="직선 화살표 연결선 73">
             <a:extLst>
               <a:ext uri="{FF2B5EF4-FFF2-40B4-BE49-F238E27FC236}">
-                <a16:creationId xmlns="" xmlns:a16="http://schemas.microsoft.com/office/drawing/2014/main" id="{C9D71470-6397-4462-9CD7-3342A408F653}"/>
+                <a16:creationId xmlns:a16="http://schemas.microsoft.com/office/drawing/2014/main" xmlns="" id="{C9D71470-6397-4462-9CD7-3342A408F653}"/>
               </a:ext>
             </a:extLst>
           </p:cNvPr>
@@ -5205,7 +4855,7 @@
           <p:cNvPr id="77" name="직선 화살표 연결선 76">
             <a:extLst>
               <a:ext uri="{FF2B5EF4-FFF2-40B4-BE49-F238E27FC236}">
-                <a16:creationId xmlns="" xmlns:a16="http://schemas.microsoft.com/office/drawing/2014/main" id="{1AB1D632-40F9-4BE5-926A-9BAF602EFD27}"/>
+                <a16:creationId xmlns:a16="http://schemas.microsoft.com/office/drawing/2014/main" xmlns="" id="{1AB1D632-40F9-4BE5-926A-9BAF602EFD27}"/>
               </a:ext>
             </a:extLst>
           </p:cNvPr>
@@ -5250,7 +4900,7 @@
     </p:spTree>
     <p:extLst>
       <p:ext uri="{BB962C8B-B14F-4D97-AF65-F5344CB8AC3E}">
-        <p14:creationId xmlns="" xmlns:p14="http://schemas.microsoft.com/office/powerpoint/2010/main" val="2062751274"/>
+        <p14:creationId xmlns:p14="http://schemas.microsoft.com/office/powerpoint/2010/main" xmlns="" val="2062751274"/>
       </p:ext>
     </p:extLst>
   </p:cSld>
@@ -5293,7 +4943,7 @@
           <p:nvPr>
             <p:extLst>
               <p:ext uri="{D42A27DB-BD31-4B8C-83A1-F6EECF244321}">
-                <p14:modId xmlns="" xmlns:p14="http://schemas.microsoft.com/office/powerpoint/2010/main" val="800116294"/>
+                <p14:modId xmlns:p14="http://schemas.microsoft.com/office/powerpoint/2010/main" xmlns="" val="800116294"/>
               </p:ext>
             </p:extLst>
           </p:nvPr>
@@ -5312,14 +4962,14 @@
                 <a:gridCol w="1277451">
                   <a:extLst>
                     <a:ext uri="{9D8B030D-6E8A-4147-A177-3AD203B41FA5}">
-                      <a16:colId xmlns="" xmlns:a16="http://schemas.microsoft.com/office/drawing/2014/main" val="3755282693"/>
+                      <a16:colId xmlns:a16="http://schemas.microsoft.com/office/drawing/2014/main" xmlns="" val="3755282693"/>
                     </a:ext>
                   </a:extLst>
                 </a:gridCol>
                 <a:gridCol w="2414016">
                   <a:extLst>
                     <a:ext uri="{9D8B030D-6E8A-4147-A177-3AD203B41FA5}">
-                      <a16:colId xmlns="" xmlns:a16="http://schemas.microsoft.com/office/drawing/2014/main" val="276504630"/>
+                      <a16:colId xmlns:a16="http://schemas.microsoft.com/office/drawing/2014/main" xmlns="" val="276504630"/>
                     </a:ext>
                   </a:extLst>
                 </a:gridCol>
@@ -5454,7 +5104,7 @@
                 </a:tc>
                 <a:extLst>
                   <a:ext uri="{0D108BD9-81ED-4DB2-BD59-A6C34878D82A}">
-                    <a16:rowId xmlns="" xmlns:a16="http://schemas.microsoft.com/office/drawing/2014/main" val="2659151920"/>
+                    <a16:rowId xmlns:a16="http://schemas.microsoft.com/office/drawing/2014/main" xmlns="" val="2659151920"/>
                   </a:ext>
                 </a:extLst>
               </a:tr>
@@ -5580,7 +5230,7 @@
                 </a:tc>
                 <a:extLst>
                   <a:ext uri="{0D108BD9-81ED-4DB2-BD59-A6C34878D82A}">
-                    <a16:rowId xmlns="" xmlns:a16="http://schemas.microsoft.com/office/drawing/2014/main" val="2965605005"/>
+                    <a16:rowId xmlns:a16="http://schemas.microsoft.com/office/drawing/2014/main" xmlns="" val="2965605005"/>
                   </a:ext>
                 </a:extLst>
               </a:tr>
@@ -5706,7 +5356,7 @@
                 </a:tc>
                 <a:extLst>
                   <a:ext uri="{0D108BD9-81ED-4DB2-BD59-A6C34878D82A}">
-                    <a16:rowId xmlns="" xmlns:a16="http://schemas.microsoft.com/office/drawing/2014/main" val="1423130289"/>
+                    <a16:rowId xmlns:a16="http://schemas.microsoft.com/office/drawing/2014/main" xmlns="" val="1423130289"/>
                   </a:ext>
                 </a:extLst>
               </a:tr>
@@ -5832,7 +5482,7 @@
                 </a:tc>
                 <a:extLst>
                   <a:ext uri="{0D108BD9-81ED-4DB2-BD59-A6C34878D82A}">
-                    <a16:rowId xmlns="" xmlns:a16="http://schemas.microsoft.com/office/drawing/2014/main" val="2266055896"/>
+                    <a16:rowId xmlns:a16="http://schemas.microsoft.com/office/drawing/2014/main" xmlns="" val="2266055896"/>
                   </a:ext>
                 </a:extLst>
               </a:tr>
@@ -5849,7 +5499,7 @@
           <p:nvPr>
             <p:extLst>
               <p:ext uri="{D42A27DB-BD31-4B8C-83A1-F6EECF244321}">
-                <p14:modId xmlns="" xmlns:p14="http://schemas.microsoft.com/office/powerpoint/2010/main" val="1289806452"/>
+                <p14:modId xmlns:p14="http://schemas.microsoft.com/office/powerpoint/2010/main" xmlns="" val="1289806452"/>
               </p:ext>
             </p:extLst>
           </p:nvPr>
@@ -5868,14 +5518,14 @@
                 <a:gridCol w="409006">
                   <a:extLst>
                     <a:ext uri="{9D8B030D-6E8A-4147-A177-3AD203B41FA5}">
-                      <a16:colId xmlns="" xmlns:a16="http://schemas.microsoft.com/office/drawing/2014/main" val="3755282693"/>
+                      <a16:colId xmlns:a16="http://schemas.microsoft.com/office/drawing/2014/main" xmlns="" val="3755282693"/>
                     </a:ext>
                   </a:extLst>
                 </a:gridCol>
                 <a:gridCol w="3282461">
                   <a:extLst>
                     <a:ext uri="{9D8B030D-6E8A-4147-A177-3AD203B41FA5}">
-                      <a16:colId xmlns="" xmlns:a16="http://schemas.microsoft.com/office/drawing/2014/main" val="276504630"/>
+                      <a16:colId xmlns:a16="http://schemas.microsoft.com/office/drawing/2014/main" xmlns="" val="276504630"/>
                     </a:ext>
                   </a:extLst>
                 </a:gridCol>
@@ -5990,7 +5640,7 @@
                 </a:tc>
                 <a:extLst>
                   <a:ext uri="{0D108BD9-81ED-4DB2-BD59-A6C34878D82A}">
-                    <a16:rowId xmlns="" xmlns:a16="http://schemas.microsoft.com/office/drawing/2014/main" val="2659151920"/>
+                    <a16:rowId xmlns:a16="http://schemas.microsoft.com/office/drawing/2014/main" xmlns="" val="2659151920"/>
                   </a:ext>
                 </a:extLst>
               </a:tr>
@@ -6145,7 +5795,7 @@
                 </a:tc>
                 <a:extLst>
                   <a:ext uri="{0D108BD9-81ED-4DB2-BD59-A6C34878D82A}">
-                    <a16:rowId xmlns="" xmlns:a16="http://schemas.microsoft.com/office/drawing/2014/main" val="2965605005"/>
+                    <a16:rowId xmlns:a16="http://schemas.microsoft.com/office/drawing/2014/main" xmlns="" val="2965605005"/>
                   </a:ext>
                 </a:extLst>
               </a:tr>
@@ -6300,7 +5950,7 @@
                 </a:tc>
                 <a:extLst>
                   <a:ext uri="{0D108BD9-81ED-4DB2-BD59-A6C34878D82A}">
-                    <a16:rowId xmlns="" xmlns:a16="http://schemas.microsoft.com/office/drawing/2014/main" val="1423130289"/>
+                    <a16:rowId xmlns:a16="http://schemas.microsoft.com/office/drawing/2014/main" xmlns="" val="1423130289"/>
                   </a:ext>
                 </a:extLst>
               </a:tr>
@@ -6455,7 +6105,7 @@
                 </a:tc>
                 <a:extLst>
                   <a:ext uri="{0D108BD9-81ED-4DB2-BD59-A6C34878D82A}">
-                    <a16:rowId xmlns="" xmlns:a16="http://schemas.microsoft.com/office/drawing/2014/main" val="2266055896"/>
+                    <a16:rowId xmlns:a16="http://schemas.microsoft.com/office/drawing/2014/main" xmlns="" val="2266055896"/>
                   </a:ext>
                 </a:extLst>
               </a:tr>
@@ -6626,7 +6276,7 @@
                 </a:tc>
                 <a:extLst>
                   <a:ext uri="{0D108BD9-81ED-4DB2-BD59-A6C34878D82A}">
-                    <a16:rowId xmlns="" xmlns:a16="http://schemas.microsoft.com/office/drawing/2014/main" val="3843794568"/>
+                    <a16:rowId xmlns:a16="http://schemas.microsoft.com/office/drawing/2014/main" xmlns="" val="3843794568"/>
                   </a:ext>
                 </a:extLst>
               </a:tr>
@@ -6789,7 +6439,7 @@
                 </a:tc>
                 <a:extLst>
                   <a:ext uri="{0D108BD9-81ED-4DB2-BD59-A6C34878D82A}">
-                    <a16:rowId xmlns="" xmlns:a16="http://schemas.microsoft.com/office/drawing/2014/main" val="2414411094"/>
+                    <a16:rowId xmlns:a16="http://schemas.microsoft.com/office/drawing/2014/main" xmlns="" val="2414411094"/>
                   </a:ext>
                 </a:extLst>
               </a:tr>
@@ -6944,7 +6594,7 @@
                 </a:tc>
                 <a:extLst>
                   <a:ext uri="{0D108BD9-81ED-4DB2-BD59-A6C34878D82A}">
-                    <a16:rowId xmlns="" xmlns:a16="http://schemas.microsoft.com/office/drawing/2014/main" val="2875470382"/>
+                    <a16:rowId xmlns:a16="http://schemas.microsoft.com/office/drawing/2014/main" xmlns="" val="2875470382"/>
                   </a:ext>
                 </a:extLst>
               </a:tr>
@@ -7115,7 +6765,7 @@
                 </a:tc>
                 <a:extLst>
                   <a:ext uri="{0D108BD9-81ED-4DB2-BD59-A6C34878D82A}">
-                    <a16:rowId xmlns="" xmlns:a16="http://schemas.microsoft.com/office/drawing/2014/main" val="1898222468"/>
+                    <a16:rowId xmlns:a16="http://schemas.microsoft.com/office/drawing/2014/main" xmlns="" val="1898222468"/>
                   </a:ext>
                 </a:extLst>
               </a:tr>
@@ -7278,7 +6928,7 @@
                 </a:tc>
                 <a:extLst>
                   <a:ext uri="{0D108BD9-81ED-4DB2-BD59-A6C34878D82A}">
-                    <a16:rowId xmlns="" xmlns:a16="http://schemas.microsoft.com/office/drawing/2014/main" val="2850959680"/>
+                    <a16:rowId xmlns:a16="http://schemas.microsoft.com/office/drawing/2014/main" xmlns="" val="2850959680"/>
                   </a:ext>
                 </a:extLst>
               </a:tr>
@@ -7441,7 +7091,7 @@
                 </a:tc>
                 <a:extLst>
                   <a:ext uri="{0D108BD9-81ED-4DB2-BD59-A6C34878D82A}">
-                    <a16:rowId xmlns="" xmlns:a16="http://schemas.microsoft.com/office/drawing/2014/main" val="1928537006"/>
+                    <a16:rowId xmlns:a16="http://schemas.microsoft.com/office/drawing/2014/main" xmlns="" val="1928537006"/>
                   </a:ext>
                 </a:extLst>
               </a:tr>
@@ -7596,7 +7246,7 @@
                 </a:tc>
                 <a:extLst>
                   <a:ext uri="{0D108BD9-81ED-4DB2-BD59-A6C34878D82A}">
-                    <a16:rowId xmlns="" xmlns:a16="http://schemas.microsoft.com/office/drawing/2014/main" val="869553709"/>
+                    <a16:rowId xmlns:a16="http://schemas.microsoft.com/office/drawing/2014/main" xmlns="" val="869553709"/>
                   </a:ext>
                 </a:extLst>
               </a:tr>
@@ -7711,7 +7361,7 @@
                 </a:tc>
                 <a:extLst>
                   <a:ext uri="{0D108BD9-81ED-4DB2-BD59-A6C34878D82A}">
-                    <a16:rowId xmlns="" xmlns:a16="http://schemas.microsoft.com/office/drawing/2014/main" val="613171441"/>
+                    <a16:rowId xmlns:a16="http://schemas.microsoft.com/office/drawing/2014/main" xmlns="" val="613171441"/>
                   </a:ext>
                 </a:extLst>
               </a:tr>
@@ -7826,7 +7476,7 @@
                 </a:tc>
                 <a:extLst>
                   <a:ext uri="{0D108BD9-81ED-4DB2-BD59-A6C34878D82A}">
-                    <a16:rowId xmlns="" xmlns:a16="http://schemas.microsoft.com/office/drawing/2014/main" val="1084277171"/>
+                    <a16:rowId xmlns:a16="http://schemas.microsoft.com/office/drawing/2014/main" xmlns="" val="1084277171"/>
                   </a:ext>
                 </a:extLst>
               </a:tr>
@@ -7988,7 +7638,7 @@
     </p:spTree>
     <p:extLst>
       <p:ext uri="{BB962C8B-B14F-4D97-AF65-F5344CB8AC3E}">
-        <p14:creationId xmlns="" xmlns:p14="http://schemas.microsoft.com/office/powerpoint/2010/main" val="519251022"/>
+        <p14:creationId xmlns:p14="http://schemas.microsoft.com/office/powerpoint/2010/main" xmlns="" val="519251022"/>
       </p:ext>
     </p:extLst>
   </p:cSld>
@@ -8031,7 +7681,7 @@
           <p:nvPr>
             <p:extLst>
               <p:ext uri="{D42A27DB-BD31-4B8C-83A1-F6EECF244321}">
-                <p14:modId xmlns="" xmlns:p14="http://schemas.microsoft.com/office/powerpoint/2010/main" val="1986721440"/>
+                <p14:modId xmlns:p14="http://schemas.microsoft.com/office/powerpoint/2010/main" xmlns="" val="1986721440"/>
               </p:ext>
             </p:extLst>
           </p:nvPr>
@@ -8050,14 +7700,14 @@
                 <a:gridCol w="1277451">
                   <a:extLst>
                     <a:ext uri="{9D8B030D-6E8A-4147-A177-3AD203B41FA5}">
-                      <a16:colId xmlns="" xmlns:a16="http://schemas.microsoft.com/office/drawing/2014/main" val="3755282693"/>
+                      <a16:colId xmlns:a16="http://schemas.microsoft.com/office/drawing/2014/main" xmlns="" val="3755282693"/>
                     </a:ext>
                   </a:extLst>
                 </a:gridCol>
                 <a:gridCol w="2414016">
                   <a:extLst>
                     <a:ext uri="{9D8B030D-6E8A-4147-A177-3AD203B41FA5}">
-                      <a16:colId xmlns="" xmlns:a16="http://schemas.microsoft.com/office/drawing/2014/main" val="276504630"/>
+                      <a16:colId xmlns:a16="http://schemas.microsoft.com/office/drawing/2014/main" xmlns="" val="276504630"/>
                     </a:ext>
                   </a:extLst>
                 </a:gridCol>
@@ -8192,7 +7842,7 @@
                 </a:tc>
                 <a:extLst>
                   <a:ext uri="{0D108BD9-81ED-4DB2-BD59-A6C34878D82A}">
-                    <a16:rowId xmlns="" xmlns:a16="http://schemas.microsoft.com/office/drawing/2014/main" val="2659151920"/>
+                    <a16:rowId xmlns:a16="http://schemas.microsoft.com/office/drawing/2014/main" xmlns="" val="2659151920"/>
                   </a:ext>
                 </a:extLst>
               </a:tr>
@@ -8318,7 +7968,7 @@
                 </a:tc>
                 <a:extLst>
                   <a:ext uri="{0D108BD9-81ED-4DB2-BD59-A6C34878D82A}">
-                    <a16:rowId xmlns="" xmlns:a16="http://schemas.microsoft.com/office/drawing/2014/main" val="2965605005"/>
+                    <a16:rowId xmlns:a16="http://schemas.microsoft.com/office/drawing/2014/main" xmlns="" val="2965605005"/>
                   </a:ext>
                 </a:extLst>
               </a:tr>
@@ -8444,7 +8094,7 @@
                 </a:tc>
                 <a:extLst>
                   <a:ext uri="{0D108BD9-81ED-4DB2-BD59-A6C34878D82A}">
-                    <a16:rowId xmlns="" xmlns:a16="http://schemas.microsoft.com/office/drawing/2014/main" val="1423130289"/>
+                    <a16:rowId xmlns:a16="http://schemas.microsoft.com/office/drawing/2014/main" xmlns="" val="1423130289"/>
                   </a:ext>
                 </a:extLst>
               </a:tr>
@@ -8565,7 +8215,7 @@
                 </a:tc>
                 <a:extLst>
                   <a:ext uri="{0D108BD9-81ED-4DB2-BD59-A6C34878D82A}">
-                    <a16:rowId xmlns="" xmlns:a16="http://schemas.microsoft.com/office/drawing/2014/main" val="2266055896"/>
+                    <a16:rowId xmlns:a16="http://schemas.microsoft.com/office/drawing/2014/main" xmlns="" val="2266055896"/>
                   </a:ext>
                 </a:extLst>
               </a:tr>
@@ -8582,7 +8232,7 @@
           <p:nvPr>
             <p:extLst>
               <p:ext uri="{D42A27DB-BD31-4B8C-83A1-F6EECF244321}">
-                <p14:modId xmlns="" xmlns:p14="http://schemas.microsoft.com/office/powerpoint/2010/main" val="3546774472"/>
+                <p14:modId xmlns:p14="http://schemas.microsoft.com/office/powerpoint/2010/main" xmlns="" val="3546774472"/>
               </p:ext>
             </p:extLst>
           </p:nvPr>
@@ -8601,21 +8251,21 @@
                 <a:gridCol w="409006">
                   <a:extLst>
                     <a:ext uri="{9D8B030D-6E8A-4147-A177-3AD203B41FA5}">
-                      <a16:colId xmlns="" xmlns:a16="http://schemas.microsoft.com/office/drawing/2014/main" val="3755282693"/>
+                      <a16:colId xmlns:a16="http://schemas.microsoft.com/office/drawing/2014/main" xmlns="" val="3755282693"/>
                     </a:ext>
                   </a:extLst>
                 </a:gridCol>
                 <a:gridCol w="475762">
                   <a:extLst>
                     <a:ext uri="{9D8B030D-6E8A-4147-A177-3AD203B41FA5}">
-                      <a16:colId xmlns="" xmlns:a16="http://schemas.microsoft.com/office/drawing/2014/main" val="276504630"/>
+                      <a16:colId xmlns:a16="http://schemas.microsoft.com/office/drawing/2014/main" xmlns="" val="276504630"/>
                     </a:ext>
                   </a:extLst>
                 </a:gridCol>
                 <a:gridCol w="2806699">
                   <a:extLst>
                     <a:ext uri="{9D8B030D-6E8A-4147-A177-3AD203B41FA5}">
-                      <a16:colId xmlns="" xmlns:a16="http://schemas.microsoft.com/office/drawing/2014/main" val="1644896112"/>
+                      <a16:colId xmlns:a16="http://schemas.microsoft.com/office/drawing/2014/main" xmlns="" val="1644896112"/>
                     </a:ext>
                   </a:extLst>
                 </a:gridCol>
@@ -8785,7 +8435,7 @@
                 </a:tc>
                 <a:extLst>
                   <a:ext uri="{0D108BD9-81ED-4DB2-BD59-A6C34878D82A}">
-                    <a16:rowId xmlns="" xmlns:a16="http://schemas.microsoft.com/office/drawing/2014/main" val="2659151920"/>
+                    <a16:rowId xmlns:a16="http://schemas.microsoft.com/office/drawing/2014/main" xmlns="" val="2659151920"/>
                   </a:ext>
                 </a:extLst>
               </a:tr>
@@ -8972,7 +8622,7 @@
                 </a:tc>
                 <a:extLst>
                   <a:ext uri="{0D108BD9-81ED-4DB2-BD59-A6C34878D82A}">
-                    <a16:rowId xmlns="" xmlns:a16="http://schemas.microsoft.com/office/drawing/2014/main" val="2965605005"/>
+                    <a16:rowId xmlns:a16="http://schemas.microsoft.com/office/drawing/2014/main" xmlns="" val="2965605005"/>
                   </a:ext>
                 </a:extLst>
               </a:tr>
@@ -9172,7 +8822,7 @@
                 </a:tc>
                 <a:extLst>
                   <a:ext uri="{0D108BD9-81ED-4DB2-BD59-A6C34878D82A}">
-                    <a16:rowId xmlns="" xmlns:a16="http://schemas.microsoft.com/office/drawing/2014/main" val="1423130289"/>
+                    <a16:rowId xmlns:a16="http://schemas.microsoft.com/office/drawing/2014/main" xmlns="" val="1423130289"/>
                   </a:ext>
                 </a:extLst>
               </a:tr>
@@ -9388,7 +9038,7 @@
                 </a:tc>
                 <a:extLst>
                   <a:ext uri="{0D108BD9-81ED-4DB2-BD59-A6C34878D82A}">
-                    <a16:rowId xmlns="" xmlns:a16="http://schemas.microsoft.com/office/drawing/2014/main" val="2266055896"/>
+                    <a16:rowId xmlns:a16="http://schemas.microsoft.com/office/drawing/2014/main" xmlns="" val="2266055896"/>
                   </a:ext>
                 </a:extLst>
               </a:tr>
@@ -9588,7 +9238,7 @@
                 </a:tc>
                 <a:extLst>
                   <a:ext uri="{0D108BD9-81ED-4DB2-BD59-A6C34878D82A}">
-                    <a16:rowId xmlns="" xmlns:a16="http://schemas.microsoft.com/office/drawing/2014/main" val="3843794568"/>
+                    <a16:rowId xmlns:a16="http://schemas.microsoft.com/office/drawing/2014/main" xmlns="" val="3843794568"/>
                   </a:ext>
                 </a:extLst>
               </a:tr>
@@ -9796,7 +9446,7 @@
                 </a:tc>
                 <a:extLst>
                   <a:ext uri="{0D108BD9-81ED-4DB2-BD59-A6C34878D82A}">
-                    <a16:rowId xmlns="" xmlns:a16="http://schemas.microsoft.com/office/drawing/2014/main" val="2414411094"/>
+                    <a16:rowId xmlns:a16="http://schemas.microsoft.com/office/drawing/2014/main" xmlns="" val="2414411094"/>
                   </a:ext>
                 </a:extLst>
               </a:tr>
@@ -10004,7 +9654,7 @@
                 </a:tc>
                 <a:extLst>
                   <a:ext uri="{0D108BD9-81ED-4DB2-BD59-A6C34878D82A}">
-                    <a16:rowId xmlns="" xmlns:a16="http://schemas.microsoft.com/office/drawing/2014/main" val="2875470382"/>
+                    <a16:rowId xmlns:a16="http://schemas.microsoft.com/office/drawing/2014/main" xmlns="" val="2875470382"/>
                   </a:ext>
                 </a:extLst>
               </a:tr>
@@ -10220,7 +9870,7 @@
                 </a:tc>
                 <a:extLst>
                   <a:ext uri="{0D108BD9-81ED-4DB2-BD59-A6C34878D82A}">
-                    <a16:rowId xmlns="" xmlns:a16="http://schemas.microsoft.com/office/drawing/2014/main" val="1898222468"/>
+                    <a16:rowId xmlns:a16="http://schemas.microsoft.com/office/drawing/2014/main" xmlns="" val="1898222468"/>
                   </a:ext>
                 </a:extLst>
               </a:tr>
@@ -10388,7 +10038,7 @@
                 </a:tc>
                 <a:extLst>
                   <a:ext uri="{0D108BD9-81ED-4DB2-BD59-A6C34878D82A}">
-                    <a16:rowId xmlns="" xmlns:a16="http://schemas.microsoft.com/office/drawing/2014/main" val="2850959680"/>
+                    <a16:rowId xmlns:a16="http://schemas.microsoft.com/office/drawing/2014/main" xmlns="" val="2850959680"/>
                   </a:ext>
                 </a:extLst>
               </a:tr>
@@ -10561,7 +10211,7 @@
                 </a:tc>
                 <a:extLst>
                   <a:ext uri="{0D108BD9-81ED-4DB2-BD59-A6C34878D82A}">
-                    <a16:rowId xmlns="" xmlns:a16="http://schemas.microsoft.com/office/drawing/2014/main" val="1533416230"/>
+                    <a16:rowId xmlns:a16="http://schemas.microsoft.com/office/drawing/2014/main" xmlns="" val="1533416230"/>
                   </a:ext>
                 </a:extLst>
               </a:tr>
@@ -10730,7 +10380,7 @@
                 </a:tc>
                 <a:extLst>
                   <a:ext uri="{0D108BD9-81ED-4DB2-BD59-A6C34878D82A}">
-                    <a16:rowId xmlns="" xmlns:a16="http://schemas.microsoft.com/office/drawing/2014/main" val="1776258069"/>
+                    <a16:rowId xmlns:a16="http://schemas.microsoft.com/office/drawing/2014/main" xmlns="" val="1776258069"/>
                   </a:ext>
                 </a:extLst>
               </a:tr>
@@ -10899,7 +10549,7 @@
                 </a:tc>
                 <a:extLst>
                   <a:ext uri="{0D108BD9-81ED-4DB2-BD59-A6C34878D82A}">
-                    <a16:rowId xmlns="" xmlns:a16="http://schemas.microsoft.com/office/drawing/2014/main" val="2054699763"/>
+                    <a16:rowId xmlns:a16="http://schemas.microsoft.com/office/drawing/2014/main" xmlns="" val="2054699763"/>
                   </a:ext>
                 </a:extLst>
               </a:tr>
@@ -11068,7 +10718,7 @@
                 </a:tc>
                 <a:extLst>
                   <a:ext uri="{0D108BD9-81ED-4DB2-BD59-A6C34878D82A}">
-                    <a16:rowId xmlns="" xmlns:a16="http://schemas.microsoft.com/office/drawing/2014/main" val="792755357"/>
+                    <a16:rowId xmlns:a16="http://schemas.microsoft.com/office/drawing/2014/main" xmlns="" val="792755357"/>
                   </a:ext>
                 </a:extLst>
               </a:tr>
@@ -11164,7 +10814,7 @@
     </p:spTree>
     <p:extLst>
       <p:ext uri="{BB962C8B-B14F-4D97-AF65-F5344CB8AC3E}">
-        <p14:creationId xmlns="" xmlns:p14="http://schemas.microsoft.com/office/powerpoint/2010/main" val="2682718429"/>
+        <p14:creationId xmlns:p14="http://schemas.microsoft.com/office/powerpoint/2010/main" xmlns="" val="2682718429"/>
       </p:ext>
     </p:extLst>
   </p:cSld>
@@ -11207,7 +10857,7 @@
           <p:nvPr>
             <p:extLst>
               <p:ext uri="{D42A27DB-BD31-4B8C-83A1-F6EECF244321}">
-                <p14:modId xmlns="" xmlns:p14="http://schemas.microsoft.com/office/powerpoint/2010/main" val="788526585"/>
+                <p14:modId xmlns:p14="http://schemas.microsoft.com/office/powerpoint/2010/main" xmlns="" val="788526585"/>
               </p:ext>
             </p:extLst>
           </p:nvPr>
@@ -11226,14 +10876,14 @@
                 <a:gridCol w="1277451">
                   <a:extLst>
                     <a:ext uri="{9D8B030D-6E8A-4147-A177-3AD203B41FA5}">
-                      <a16:colId xmlns="" xmlns:a16="http://schemas.microsoft.com/office/drawing/2014/main" val="3755282693"/>
+                      <a16:colId xmlns:a16="http://schemas.microsoft.com/office/drawing/2014/main" xmlns="" val="3755282693"/>
                     </a:ext>
                   </a:extLst>
                 </a:gridCol>
                 <a:gridCol w="2414016">
                   <a:extLst>
                     <a:ext uri="{9D8B030D-6E8A-4147-A177-3AD203B41FA5}">
-                      <a16:colId xmlns="" xmlns:a16="http://schemas.microsoft.com/office/drawing/2014/main" val="276504630"/>
+                      <a16:colId xmlns:a16="http://schemas.microsoft.com/office/drawing/2014/main" xmlns="" val="276504630"/>
                     </a:ext>
                   </a:extLst>
                 </a:gridCol>
@@ -11368,7 +11018,7 @@
                 </a:tc>
                 <a:extLst>
                   <a:ext uri="{0D108BD9-81ED-4DB2-BD59-A6C34878D82A}">
-                    <a16:rowId xmlns="" xmlns:a16="http://schemas.microsoft.com/office/drawing/2014/main" val="2659151920"/>
+                    <a16:rowId xmlns:a16="http://schemas.microsoft.com/office/drawing/2014/main" xmlns="" val="2659151920"/>
                   </a:ext>
                 </a:extLst>
               </a:tr>
@@ -11486,7 +11136,7 @@
                 </a:tc>
                 <a:extLst>
                   <a:ext uri="{0D108BD9-81ED-4DB2-BD59-A6C34878D82A}">
-                    <a16:rowId xmlns="" xmlns:a16="http://schemas.microsoft.com/office/drawing/2014/main" val="2965605005"/>
+                    <a16:rowId xmlns:a16="http://schemas.microsoft.com/office/drawing/2014/main" xmlns="" val="2965605005"/>
                   </a:ext>
                 </a:extLst>
               </a:tr>
@@ -11604,7 +11254,7 @@
                 </a:tc>
                 <a:extLst>
                   <a:ext uri="{0D108BD9-81ED-4DB2-BD59-A6C34878D82A}">
-                    <a16:rowId xmlns="" xmlns:a16="http://schemas.microsoft.com/office/drawing/2014/main" val="1423130289"/>
+                    <a16:rowId xmlns:a16="http://schemas.microsoft.com/office/drawing/2014/main" xmlns="" val="1423130289"/>
                   </a:ext>
                 </a:extLst>
               </a:tr>
@@ -11722,7 +11372,7 @@
                 </a:tc>
                 <a:extLst>
                   <a:ext uri="{0D108BD9-81ED-4DB2-BD59-A6C34878D82A}">
-                    <a16:rowId xmlns="" xmlns:a16="http://schemas.microsoft.com/office/drawing/2014/main" val="2266055896"/>
+                    <a16:rowId xmlns:a16="http://schemas.microsoft.com/office/drawing/2014/main" xmlns="" val="2266055896"/>
                   </a:ext>
                 </a:extLst>
               </a:tr>
@@ -11739,7 +11389,7 @@
           <p:nvPr>
             <p:extLst>
               <p:ext uri="{D42A27DB-BD31-4B8C-83A1-F6EECF244321}">
-                <p14:modId xmlns="" xmlns:p14="http://schemas.microsoft.com/office/powerpoint/2010/main" val="1047247137"/>
+                <p14:modId xmlns:p14="http://schemas.microsoft.com/office/powerpoint/2010/main" xmlns="" val="1047247137"/>
               </p:ext>
             </p:extLst>
           </p:nvPr>
@@ -11758,21 +11408,21 @@
                 <a:gridCol w="409006">
                   <a:extLst>
                     <a:ext uri="{9D8B030D-6E8A-4147-A177-3AD203B41FA5}">
-                      <a16:colId xmlns="" xmlns:a16="http://schemas.microsoft.com/office/drawing/2014/main" val="3755282693"/>
+                      <a16:colId xmlns:a16="http://schemas.microsoft.com/office/drawing/2014/main" xmlns="" val="3755282693"/>
                     </a:ext>
                   </a:extLst>
                 </a:gridCol>
                 <a:gridCol w="475762">
                   <a:extLst>
                     <a:ext uri="{9D8B030D-6E8A-4147-A177-3AD203B41FA5}">
-                      <a16:colId xmlns="" xmlns:a16="http://schemas.microsoft.com/office/drawing/2014/main" val="276504630"/>
+                      <a16:colId xmlns:a16="http://schemas.microsoft.com/office/drawing/2014/main" xmlns="" val="276504630"/>
                     </a:ext>
                   </a:extLst>
                 </a:gridCol>
                 <a:gridCol w="2806699">
                   <a:extLst>
                     <a:ext uri="{9D8B030D-6E8A-4147-A177-3AD203B41FA5}">
-                      <a16:colId xmlns="" xmlns:a16="http://schemas.microsoft.com/office/drawing/2014/main" val="1644896112"/>
+                      <a16:colId xmlns:a16="http://schemas.microsoft.com/office/drawing/2014/main" xmlns="" val="1644896112"/>
                     </a:ext>
                   </a:extLst>
                 </a:gridCol>
@@ -11942,7 +11592,7 @@
                 </a:tc>
                 <a:extLst>
                   <a:ext uri="{0D108BD9-81ED-4DB2-BD59-A6C34878D82A}">
-                    <a16:rowId xmlns="" xmlns:a16="http://schemas.microsoft.com/office/drawing/2014/main" val="2659151920"/>
+                    <a16:rowId xmlns:a16="http://schemas.microsoft.com/office/drawing/2014/main" xmlns="" val="2659151920"/>
                   </a:ext>
                 </a:extLst>
               </a:tr>
@@ -12110,7 +11760,7 @@
                 </a:tc>
                 <a:extLst>
                   <a:ext uri="{0D108BD9-81ED-4DB2-BD59-A6C34878D82A}">
-                    <a16:rowId xmlns="" xmlns:a16="http://schemas.microsoft.com/office/drawing/2014/main" val="2965605005"/>
+                    <a16:rowId xmlns:a16="http://schemas.microsoft.com/office/drawing/2014/main" xmlns="" val="2965605005"/>
                   </a:ext>
                 </a:extLst>
               </a:tr>
@@ -12278,7 +11928,7 @@
                 </a:tc>
                 <a:extLst>
                   <a:ext uri="{0D108BD9-81ED-4DB2-BD59-A6C34878D82A}">
-                    <a16:rowId xmlns="" xmlns:a16="http://schemas.microsoft.com/office/drawing/2014/main" val="1423130289"/>
+                    <a16:rowId xmlns:a16="http://schemas.microsoft.com/office/drawing/2014/main" xmlns="" val="1423130289"/>
                   </a:ext>
                 </a:extLst>
               </a:tr>
@@ -12446,7 +12096,7 @@
                 </a:tc>
                 <a:extLst>
                   <a:ext uri="{0D108BD9-81ED-4DB2-BD59-A6C34878D82A}">
-                    <a16:rowId xmlns="" xmlns:a16="http://schemas.microsoft.com/office/drawing/2014/main" val="2266055896"/>
+                    <a16:rowId xmlns:a16="http://schemas.microsoft.com/office/drawing/2014/main" xmlns="" val="2266055896"/>
                   </a:ext>
                 </a:extLst>
               </a:tr>
@@ -12614,7 +12264,7 @@
                 </a:tc>
                 <a:extLst>
                   <a:ext uri="{0D108BD9-81ED-4DB2-BD59-A6C34878D82A}">
-                    <a16:rowId xmlns="" xmlns:a16="http://schemas.microsoft.com/office/drawing/2014/main" val="3843794568"/>
+                    <a16:rowId xmlns:a16="http://schemas.microsoft.com/office/drawing/2014/main" xmlns="" val="3843794568"/>
                   </a:ext>
                 </a:extLst>
               </a:tr>
@@ -12782,7 +12432,7 @@
                 </a:tc>
                 <a:extLst>
                   <a:ext uri="{0D108BD9-81ED-4DB2-BD59-A6C34878D82A}">
-                    <a16:rowId xmlns="" xmlns:a16="http://schemas.microsoft.com/office/drawing/2014/main" val="2414411094"/>
+                    <a16:rowId xmlns:a16="http://schemas.microsoft.com/office/drawing/2014/main" xmlns="" val="2414411094"/>
                   </a:ext>
                 </a:extLst>
               </a:tr>
@@ -12950,7 +12600,7 @@
                 </a:tc>
                 <a:extLst>
                   <a:ext uri="{0D108BD9-81ED-4DB2-BD59-A6C34878D82A}">
-                    <a16:rowId xmlns="" xmlns:a16="http://schemas.microsoft.com/office/drawing/2014/main" val="2875470382"/>
+                    <a16:rowId xmlns:a16="http://schemas.microsoft.com/office/drawing/2014/main" xmlns="" val="2875470382"/>
                   </a:ext>
                 </a:extLst>
               </a:tr>
@@ -13118,7 +12768,7 @@
                 </a:tc>
                 <a:extLst>
                   <a:ext uri="{0D108BD9-81ED-4DB2-BD59-A6C34878D82A}">
-                    <a16:rowId xmlns="" xmlns:a16="http://schemas.microsoft.com/office/drawing/2014/main" val="1898222468"/>
+                    <a16:rowId xmlns:a16="http://schemas.microsoft.com/office/drawing/2014/main" xmlns="" val="1898222468"/>
                   </a:ext>
                 </a:extLst>
               </a:tr>
@@ -13286,7 +12936,7 @@
                 </a:tc>
                 <a:extLst>
                   <a:ext uri="{0D108BD9-81ED-4DB2-BD59-A6C34878D82A}">
-                    <a16:rowId xmlns="" xmlns:a16="http://schemas.microsoft.com/office/drawing/2014/main" val="2850959680"/>
+                    <a16:rowId xmlns:a16="http://schemas.microsoft.com/office/drawing/2014/main" xmlns="" val="2850959680"/>
                   </a:ext>
                 </a:extLst>
               </a:tr>
@@ -13459,7 +13109,7 @@
                 </a:tc>
                 <a:extLst>
                   <a:ext uri="{0D108BD9-81ED-4DB2-BD59-A6C34878D82A}">
-                    <a16:rowId xmlns="" xmlns:a16="http://schemas.microsoft.com/office/drawing/2014/main" val="1533416230"/>
+                    <a16:rowId xmlns:a16="http://schemas.microsoft.com/office/drawing/2014/main" xmlns="" val="1533416230"/>
                   </a:ext>
                 </a:extLst>
               </a:tr>
@@ -13628,7 +13278,7 @@
                 </a:tc>
                 <a:extLst>
                   <a:ext uri="{0D108BD9-81ED-4DB2-BD59-A6C34878D82A}">
-                    <a16:rowId xmlns="" xmlns:a16="http://schemas.microsoft.com/office/drawing/2014/main" val="1776258069"/>
+                    <a16:rowId xmlns:a16="http://schemas.microsoft.com/office/drawing/2014/main" xmlns="" val="1776258069"/>
                   </a:ext>
                 </a:extLst>
               </a:tr>
@@ -13797,7 +13447,7 @@
                 </a:tc>
                 <a:extLst>
                   <a:ext uri="{0D108BD9-81ED-4DB2-BD59-A6C34878D82A}">
-                    <a16:rowId xmlns="" xmlns:a16="http://schemas.microsoft.com/office/drawing/2014/main" val="2054699763"/>
+                    <a16:rowId xmlns:a16="http://schemas.microsoft.com/office/drawing/2014/main" xmlns="" val="2054699763"/>
                   </a:ext>
                 </a:extLst>
               </a:tr>
@@ -13966,7 +13616,7 @@
                 </a:tc>
                 <a:extLst>
                   <a:ext uri="{0D108BD9-81ED-4DB2-BD59-A6C34878D82A}">
-                    <a16:rowId xmlns="" xmlns:a16="http://schemas.microsoft.com/office/drawing/2014/main" val="792755357"/>
+                    <a16:rowId xmlns:a16="http://schemas.microsoft.com/office/drawing/2014/main" xmlns="" val="792755357"/>
                   </a:ext>
                 </a:extLst>
               </a:tr>
@@ -14276,7 +13926,7 @@
     </p:spTree>
     <p:extLst>
       <p:ext uri="{BB962C8B-B14F-4D97-AF65-F5344CB8AC3E}">
-        <p14:creationId xmlns="" xmlns:p14="http://schemas.microsoft.com/office/powerpoint/2010/main" val="1747788887"/>
+        <p14:creationId xmlns:p14="http://schemas.microsoft.com/office/powerpoint/2010/main" xmlns="" val="1747788887"/>
       </p:ext>
     </p:extLst>
   </p:cSld>
@@ -14319,7 +13969,7 @@
           <p:nvPr>
             <p:extLst>
               <p:ext uri="{D42A27DB-BD31-4B8C-83A1-F6EECF244321}">
-                <p14:modId xmlns="" xmlns:p14="http://schemas.microsoft.com/office/powerpoint/2010/main" val="786280354"/>
+                <p14:modId xmlns:p14="http://schemas.microsoft.com/office/powerpoint/2010/main" xmlns="" val="786280354"/>
               </p:ext>
             </p:extLst>
           </p:nvPr>
@@ -14338,14 +13988,14 @@
                 <a:gridCol w="1277451">
                   <a:extLst>
                     <a:ext uri="{9D8B030D-6E8A-4147-A177-3AD203B41FA5}">
-                      <a16:colId xmlns="" xmlns:a16="http://schemas.microsoft.com/office/drawing/2014/main" val="3755282693"/>
+                      <a16:colId xmlns:a16="http://schemas.microsoft.com/office/drawing/2014/main" xmlns="" val="3755282693"/>
                     </a:ext>
                   </a:extLst>
                 </a:gridCol>
                 <a:gridCol w="2414016">
                   <a:extLst>
                     <a:ext uri="{9D8B030D-6E8A-4147-A177-3AD203B41FA5}">
-                      <a16:colId xmlns="" xmlns:a16="http://schemas.microsoft.com/office/drawing/2014/main" val="276504630"/>
+                      <a16:colId xmlns:a16="http://schemas.microsoft.com/office/drawing/2014/main" xmlns="" val="276504630"/>
                     </a:ext>
                   </a:extLst>
                 </a:gridCol>
@@ -14480,7 +14130,7 @@
                 </a:tc>
                 <a:extLst>
                   <a:ext uri="{0D108BD9-81ED-4DB2-BD59-A6C34878D82A}">
-                    <a16:rowId xmlns="" xmlns:a16="http://schemas.microsoft.com/office/drawing/2014/main" val="2659151920"/>
+                    <a16:rowId xmlns:a16="http://schemas.microsoft.com/office/drawing/2014/main" xmlns="" val="2659151920"/>
                   </a:ext>
                 </a:extLst>
               </a:tr>
@@ -14606,7 +14256,7 @@
                 </a:tc>
                 <a:extLst>
                   <a:ext uri="{0D108BD9-81ED-4DB2-BD59-A6C34878D82A}">
-                    <a16:rowId xmlns="" xmlns:a16="http://schemas.microsoft.com/office/drawing/2014/main" val="2965605005"/>
+                    <a16:rowId xmlns:a16="http://schemas.microsoft.com/office/drawing/2014/main" xmlns="" val="2965605005"/>
                   </a:ext>
                 </a:extLst>
               </a:tr>
@@ -14732,7 +14382,7 @@
                 </a:tc>
                 <a:extLst>
                   <a:ext uri="{0D108BD9-81ED-4DB2-BD59-A6C34878D82A}">
-                    <a16:rowId xmlns="" xmlns:a16="http://schemas.microsoft.com/office/drawing/2014/main" val="1423130289"/>
+                    <a16:rowId xmlns:a16="http://schemas.microsoft.com/office/drawing/2014/main" xmlns="" val="1423130289"/>
                   </a:ext>
                 </a:extLst>
               </a:tr>
@@ -14858,7 +14508,7 @@
                 </a:tc>
                 <a:extLst>
                   <a:ext uri="{0D108BD9-81ED-4DB2-BD59-A6C34878D82A}">
-                    <a16:rowId xmlns="" xmlns:a16="http://schemas.microsoft.com/office/drawing/2014/main" val="2266055896"/>
+                    <a16:rowId xmlns:a16="http://schemas.microsoft.com/office/drawing/2014/main" xmlns="" val="2266055896"/>
                   </a:ext>
                 </a:extLst>
               </a:tr>
@@ -14875,7 +14525,7 @@
           <p:nvPr>
             <p:extLst>
               <p:ext uri="{D42A27DB-BD31-4B8C-83A1-F6EECF244321}">
-                <p14:modId xmlns="" xmlns:p14="http://schemas.microsoft.com/office/powerpoint/2010/main" val="898662476"/>
+                <p14:modId xmlns:p14="http://schemas.microsoft.com/office/powerpoint/2010/main" xmlns="" val="898662476"/>
               </p:ext>
             </p:extLst>
           </p:nvPr>
@@ -14894,21 +14544,21 @@
                 <a:gridCol w="409006">
                   <a:extLst>
                     <a:ext uri="{9D8B030D-6E8A-4147-A177-3AD203B41FA5}">
-                      <a16:colId xmlns="" xmlns:a16="http://schemas.microsoft.com/office/drawing/2014/main" val="3755282693"/>
+                      <a16:colId xmlns:a16="http://schemas.microsoft.com/office/drawing/2014/main" xmlns="" val="3755282693"/>
                     </a:ext>
                   </a:extLst>
                 </a:gridCol>
                 <a:gridCol w="475762">
                   <a:extLst>
                     <a:ext uri="{9D8B030D-6E8A-4147-A177-3AD203B41FA5}">
-                      <a16:colId xmlns="" xmlns:a16="http://schemas.microsoft.com/office/drawing/2014/main" val="276504630"/>
+                      <a16:colId xmlns:a16="http://schemas.microsoft.com/office/drawing/2014/main" xmlns="" val="276504630"/>
                     </a:ext>
                   </a:extLst>
                 </a:gridCol>
                 <a:gridCol w="2806699">
                   <a:extLst>
                     <a:ext uri="{9D8B030D-6E8A-4147-A177-3AD203B41FA5}">
-                      <a16:colId xmlns="" xmlns:a16="http://schemas.microsoft.com/office/drawing/2014/main" val="1644896112"/>
+                      <a16:colId xmlns:a16="http://schemas.microsoft.com/office/drawing/2014/main" xmlns="" val="1644896112"/>
                     </a:ext>
                   </a:extLst>
                 </a:gridCol>
@@ -15078,7 +14728,7 @@
                 </a:tc>
                 <a:extLst>
                   <a:ext uri="{0D108BD9-81ED-4DB2-BD59-A6C34878D82A}">
-                    <a16:rowId xmlns="" xmlns:a16="http://schemas.microsoft.com/office/drawing/2014/main" val="2659151920"/>
+                    <a16:rowId xmlns:a16="http://schemas.microsoft.com/office/drawing/2014/main" xmlns="" val="2659151920"/>
                   </a:ext>
                 </a:extLst>
               </a:tr>
@@ -15292,7 +14942,7 @@
                 </a:tc>
                 <a:extLst>
                   <a:ext uri="{0D108BD9-81ED-4DB2-BD59-A6C34878D82A}">
-                    <a16:rowId xmlns="" xmlns:a16="http://schemas.microsoft.com/office/drawing/2014/main" val="2965605005"/>
+                    <a16:rowId xmlns:a16="http://schemas.microsoft.com/office/drawing/2014/main" xmlns="" val="2965605005"/>
                   </a:ext>
                 </a:extLst>
               </a:tr>
@@ -15479,7 +15129,7 @@
                 </a:tc>
                 <a:extLst>
                   <a:ext uri="{0D108BD9-81ED-4DB2-BD59-A6C34878D82A}">
-                    <a16:rowId xmlns="" xmlns:a16="http://schemas.microsoft.com/office/drawing/2014/main" val="1423130289"/>
+                    <a16:rowId xmlns:a16="http://schemas.microsoft.com/office/drawing/2014/main" xmlns="" val="1423130289"/>
                   </a:ext>
                 </a:extLst>
               </a:tr>
@@ -15567,31 +15217,7 @@
                             <a:schemeClr val="tx1"/>
                           </a:solidFill>
                         </a:rPr>
-                        <a:t>연락처와</a:t>
-                      </a:r>
-                      <a:r>
-                        <a:rPr lang="ko-KR" altLang="en-US" sz="1200" baseline="0" dirty="0" smtClean="0">
-                          <a:solidFill>
-                            <a:schemeClr val="tx1"/>
-                          </a:solidFill>
-                        </a:rPr>
-                        <a:t> </a:t>
-                      </a:r>
-                      <a:r>
-                        <a:rPr lang="ko-KR" altLang="en-US" sz="1200" dirty="0" smtClean="0">
-                          <a:solidFill>
-                            <a:schemeClr val="tx1"/>
-                          </a:solidFill>
-                        </a:rPr>
-                        <a:t>최종학력만 </a:t>
-                      </a:r>
-                      <a:r>
-                        <a:rPr lang="ko-KR" altLang="en-US" sz="1200" dirty="0" smtClean="0">
-                          <a:solidFill>
-                            <a:schemeClr val="tx1"/>
-                          </a:solidFill>
-                        </a:rPr>
-                        <a:t>수정이 가능하다</a:t>
+                        <a:t>최종학력만 수정이 가능하다</a:t>
                       </a:r>
                       <a:r>
                         <a:rPr lang="en-US" altLang="ko-KR" sz="1200" dirty="0" smtClean="0">
@@ -15703,7 +15329,7 @@
                 </a:tc>
                 <a:extLst>
                   <a:ext uri="{0D108BD9-81ED-4DB2-BD59-A6C34878D82A}">
-                    <a16:rowId xmlns="" xmlns:a16="http://schemas.microsoft.com/office/drawing/2014/main" val="2266055896"/>
+                    <a16:rowId xmlns:a16="http://schemas.microsoft.com/office/drawing/2014/main" xmlns="" val="2266055896"/>
                   </a:ext>
                 </a:extLst>
               </a:tr>
@@ -15775,15 +15401,15 @@
                             <a:schemeClr val="tx1"/>
                           </a:solidFill>
                         </a:rPr>
-                        <a:t>비밀번호를 제외하고 </a:t>
+                        <a:t>비밀번호를 </a:t>
                       </a:r>
                       <a:r>
-                        <a:rPr lang="ko-KR" altLang="en-US" sz="1200" dirty="0" smtClean="0">
+                        <a:rPr lang="ko-KR" altLang="en-US" sz="1200" smtClean="0">
                           <a:solidFill>
                             <a:schemeClr val="tx1"/>
                           </a:solidFill>
                         </a:rPr>
-                        <a:t>연락처와 최종학력은 </a:t>
+                        <a:t>제외하고 최종학력은 </a:t>
                       </a:r>
                       <a:r>
                         <a:rPr lang="ko-KR" altLang="en-US" sz="1200" dirty="0" smtClean="0">
@@ -15903,7 +15529,7 @@
                 </a:tc>
                 <a:extLst>
                   <a:ext uri="{0D108BD9-81ED-4DB2-BD59-A6C34878D82A}">
-                    <a16:rowId xmlns="" xmlns:a16="http://schemas.microsoft.com/office/drawing/2014/main" val="3843794568"/>
+                    <a16:rowId xmlns:a16="http://schemas.microsoft.com/office/drawing/2014/main" xmlns="" val="3843794568"/>
                   </a:ext>
                 </a:extLst>
               </a:tr>
@@ -16111,7 +15737,7 @@
                 </a:tc>
                 <a:extLst>
                   <a:ext uri="{0D108BD9-81ED-4DB2-BD59-A6C34878D82A}">
-                    <a16:rowId xmlns="" xmlns:a16="http://schemas.microsoft.com/office/drawing/2014/main" val="2414411094"/>
+                    <a16:rowId xmlns:a16="http://schemas.microsoft.com/office/drawing/2014/main" xmlns="" val="2414411094"/>
                   </a:ext>
                 </a:extLst>
               </a:tr>
@@ -16335,7 +15961,7 @@
                 </a:tc>
                 <a:extLst>
                   <a:ext uri="{0D108BD9-81ED-4DB2-BD59-A6C34878D82A}">
-                    <a16:rowId xmlns="" xmlns:a16="http://schemas.microsoft.com/office/drawing/2014/main" val="2875470382"/>
+                    <a16:rowId xmlns:a16="http://schemas.microsoft.com/office/drawing/2014/main" xmlns="" val="2875470382"/>
                   </a:ext>
                 </a:extLst>
               </a:tr>
@@ -16503,7 +16129,7 @@
                 </a:tc>
                 <a:extLst>
                   <a:ext uri="{0D108BD9-81ED-4DB2-BD59-A6C34878D82A}">
-                    <a16:rowId xmlns="" xmlns:a16="http://schemas.microsoft.com/office/drawing/2014/main" val="1898222468"/>
+                    <a16:rowId xmlns:a16="http://schemas.microsoft.com/office/drawing/2014/main" xmlns="" val="1898222468"/>
                   </a:ext>
                 </a:extLst>
               </a:tr>
@@ -16676,7 +16302,7 @@
                 </a:tc>
                 <a:extLst>
                   <a:ext uri="{0D108BD9-81ED-4DB2-BD59-A6C34878D82A}">
-                    <a16:rowId xmlns="" xmlns:a16="http://schemas.microsoft.com/office/drawing/2014/main" val="1533416230"/>
+                    <a16:rowId xmlns:a16="http://schemas.microsoft.com/office/drawing/2014/main" xmlns="" val="1533416230"/>
                   </a:ext>
                 </a:extLst>
               </a:tr>
@@ -16845,7 +16471,7 @@
                 </a:tc>
                 <a:extLst>
                   <a:ext uri="{0D108BD9-81ED-4DB2-BD59-A6C34878D82A}">
-                    <a16:rowId xmlns="" xmlns:a16="http://schemas.microsoft.com/office/drawing/2014/main" val="1776258069"/>
+                    <a16:rowId xmlns:a16="http://schemas.microsoft.com/office/drawing/2014/main" xmlns="" val="1776258069"/>
                   </a:ext>
                 </a:extLst>
               </a:tr>
@@ -17014,7 +16640,7 @@
                 </a:tc>
                 <a:extLst>
                   <a:ext uri="{0D108BD9-81ED-4DB2-BD59-A6C34878D82A}">
-                    <a16:rowId xmlns="" xmlns:a16="http://schemas.microsoft.com/office/drawing/2014/main" val="2054699763"/>
+                    <a16:rowId xmlns:a16="http://schemas.microsoft.com/office/drawing/2014/main" xmlns="" val="2054699763"/>
                   </a:ext>
                 </a:extLst>
               </a:tr>
@@ -17183,7 +16809,7 @@
                 </a:tc>
                 <a:extLst>
                   <a:ext uri="{0D108BD9-81ED-4DB2-BD59-A6C34878D82A}">
-                    <a16:rowId xmlns="" xmlns:a16="http://schemas.microsoft.com/office/drawing/2014/main" val="792755357"/>
+                    <a16:rowId xmlns:a16="http://schemas.microsoft.com/office/drawing/2014/main" xmlns="" val="792755357"/>
                   </a:ext>
                 </a:extLst>
               </a:tr>
@@ -17193,7 +16819,7 @@
       </p:graphicFrame>
       <p:pic>
         <p:nvPicPr>
-          <p:cNvPr id="1026" name="Picture 2"/>
+          <p:cNvPr id="2" name="Picture 2"/>
           <p:cNvPicPr>
             <a:picLocks noChangeAspect="1" noChangeArrowheads="1"/>
           </p:cNvPicPr>
@@ -17208,8 +16834,8 @@
         </p:blipFill>
         <p:spPr bwMode="auto">
           <a:xfrm>
-            <a:off x="0" y="834077"/>
-            <a:ext cx="8502555" cy="5162550"/>
+            <a:off x="0" y="722396"/>
+            <a:ext cx="8494296" cy="5124450"/>
           </a:xfrm>
           <a:prstGeom prst="rect">
             <a:avLst/>
@@ -17224,245 +16850,10 @@
           <a:effectLst/>
         </p:spPr>
       </p:pic>
-      <p:sp>
-        <p:nvSpPr>
-          <p:cNvPr id="7" name="타원 6"/>
-          <p:cNvSpPr/>
-          <p:nvPr/>
-        </p:nvSpPr>
-        <p:spPr>
-          <a:xfrm>
-            <a:off x="3043450" y="1392072"/>
-            <a:ext cx="614150" cy="464024"/>
-          </a:xfrm>
-          <a:prstGeom prst="ellipse">
-            <a:avLst/>
-          </a:prstGeom>
-          <a:solidFill>
-            <a:srgbClr val="FF0000"/>
-          </a:solidFill>
-        </p:spPr>
-        <p:style>
-          <a:lnRef idx="2">
-            <a:schemeClr val="accent1">
-              <a:shade val="50000"/>
-            </a:schemeClr>
-          </a:lnRef>
-          <a:fillRef idx="1">
-            <a:schemeClr val="accent1"/>
-          </a:fillRef>
-          <a:effectRef idx="0">
-            <a:schemeClr val="accent1"/>
-          </a:effectRef>
-          <a:fontRef idx="minor">
-            <a:schemeClr val="lt1"/>
-          </a:fontRef>
-        </p:style>
-        <p:txBody>
-          <a:bodyPr rtlCol="0" anchor="ctr"/>
-          <a:lstStyle/>
-          <a:p>
-            <a:pPr algn="ctr"/>
-            <a:r>
-              <a:rPr lang="en-US" altLang="ko-KR" dirty="0" smtClean="0"/>
-              <a:t>1</a:t>
-            </a:r>
-            <a:endParaRPr lang="ko-KR" altLang="en-US" dirty="0"/>
-          </a:p>
-        </p:txBody>
-      </p:sp>
-      <p:sp>
-        <p:nvSpPr>
-          <p:cNvPr id="8" name="타원 7"/>
-          <p:cNvSpPr/>
-          <p:nvPr/>
-        </p:nvSpPr>
-        <p:spPr>
-          <a:xfrm>
-            <a:off x="466297" y="2649941"/>
-            <a:ext cx="614150" cy="464024"/>
-          </a:xfrm>
-          <a:prstGeom prst="ellipse">
-            <a:avLst/>
-          </a:prstGeom>
-          <a:solidFill>
-            <a:srgbClr val="FF0000"/>
-          </a:solidFill>
-        </p:spPr>
-        <p:style>
-          <a:lnRef idx="2">
-            <a:schemeClr val="accent1">
-              <a:shade val="50000"/>
-            </a:schemeClr>
-          </a:lnRef>
-          <a:fillRef idx="1">
-            <a:schemeClr val="accent1"/>
-          </a:fillRef>
-          <a:effectRef idx="0">
-            <a:schemeClr val="accent1"/>
-          </a:effectRef>
-          <a:fontRef idx="minor">
-            <a:schemeClr val="lt1"/>
-          </a:fontRef>
-        </p:style>
-        <p:txBody>
-          <a:bodyPr rtlCol="0" anchor="ctr"/>
-          <a:lstStyle/>
-          <a:p>
-            <a:pPr algn="ctr"/>
-            <a:r>
-              <a:rPr lang="en-US" altLang="ko-KR" dirty="0" smtClean="0"/>
-              <a:t>2</a:t>
-            </a:r>
-            <a:endParaRPr lang="ko-KR" altLang="en-US" dirty="0"/>
-          </a:p>
-        </p:txBody>
-      </p:sp>
-      <p:sp>
-        <p:nvSpPr>
-          <p:cNvPr id="9" name="타원 8"/>
-          <p:cNvSpPr/>
-          <p:nvPr/>
-        </p:nvSpPr>
-        <p:spPr>
-          <a:xfrm>
-            <a:off x="1915233" y="4371833"/>
-            <a:ext cx="614150" cy="464024"/>
-          </a:xfrm>
-          <a:prstGeom prst="ellipse">
-            <a:avLst/>
-          </a:prstGeom>
-          <a:solidFill>
-            <a:srgbClr val="FF0000"/>
-          </a:solidFill>
-        </p:spPr>
-        <p:style>
-          <a:lnRef idx="2">
-            <a:schemeClr val="accent1">
-              <a:shade val="50000"/>
-            </a:schemeClr>
-          </a:lnRef>
-          <a:fillRef idx="1">
-            <a:schemeClr val="accent1"/>
-          </a:fillRef>
-          <a:effectRef idx="0">
-            <a:schemeClr val="accent1"/>
-          </a:effectRef>
-          <a:fontRef idx="minor">
-            <a:schemeClr val="lt1"/>
-          </a:fontRef>
-        </p:style>
-        <p:txBody>
-          <a:bodyPr rtlCol="0" anchor="ctr"/>
-          <a:lstStyle/>
-          <a:p>
-            <a:pPr algn="ctr"/>
-            <a:r>
-              <a:rPr lang="en-US" altLang="ko-KR" dirty="0" smtClean="0"/>
-              <a:t>3</a:t>
-            </a:r>
-            <a:endParaRPr lang="ko-KR" altLang="en-US" dirty="0"/>
-          </a:p>
-        </p:txBody>
-      </p:sp>
-      <p:sp>
-        <p:nvSpPr>
-          <p:cNvPr id="10" name="타원 9"/>
-          <p:cNvSpPr/>
-          <p:nvPr/>
-        </p:nvSpPr>
-        <p:spPr>
-          <a:xfrm>
-            <a:off x="5943597" y="4728950"/>
-            <a:ext cx="470850" cy="375313"/>
-          </a:xfrm>
-          <a:prstGeom prst="ellipse">
-            <a:avLst/>
-          </a:prstGeom>
-          <a:solidFill>
-            <a:srgbClr val="FF0000"/>
-          </a:solidFill>
-        </p:spPr>
-        <p:style>
-          <a:lnRef idx="2">
-            <a:schemeClr val="accent1">
-              <a:shade val="50000"/>
-            </a:schemeClr>
-          </a:lnRef>
-          <a:fillRef idx="1">
-            <a:schemeClr val="accent1"/>
-          </a:fillRef>
-          <a:effectRef idx="0">
-            <a:schemeClr val="accent1"/>
-          </a:effectRef>
-          <a:fontRef idx="minor">
-            <a:schemeClr val="lt1"/>
-          </a:fontRef>
-        </p:style>
-        <p:txBody>
-          <a:bodyPr rtlCol="0" anchor="ctr"/>
-          <a:lstStyle/>
-          <a:p>
-            <a:pPr algn="ctr"/>
-            <a:r>
-              <a:rPr lang="en-US" altLang="ko-KR" dirty="0" smtClean="0"/>
-              <a:t>4</a:t>
-            </a:r>
-            <a:endParaRPr lang="ko-KR" altLang="en-US" dirty="0"/>
-          </a:p>
-        </p:txBody>
-      </p:sp>
-      <p:sp>
-        <p:nvSpPr>
-          <p:cNvPr id="11" name="타원 10"/>
-          <p:cNvSpPr/>
-          <p:nvPr/>
-        </p:nvSpPr>
-        <p:spPr>
-          <a:xfrm>
-            <a:off x="6491782" y="4744872"/>
-            <a:ext cx="509519" cy="359390"/>
-          </a:xfrm>
-          <a:prstGeom prst="ellipse">
-            <a:avLst/>
-          </a:prstGeom>
-          <a:solidFill>
-            <a:srgbClr val="FF0000"/>
-          </a:solidFill>
-        </p:spPr>
-        <p:style>
-          <a:lnRef idx="2">
-            <a:schemeClr val="accent1">
-              <a:shade val="50000"/>
-            </a:schemeClr>
-          </a:lnRef>
-          <a:fillRef idx="1">
-            <a:schemeClr val="accent1"/>
-          </a:fillRef>
-          <a:effectRef idx="0">
-            <a:schemeClr val="accent1"/>
-          </a:effectRef>
-          <a:fontRef idx="minor">
-            <a:schemeClr val="lt1"/>
-          </a:fontRef>
-        </p:style>
-        <p:txBody>
-          <a:bodyPr rtlCol="0" anchor="ctr"/>
-          <a:lstStyle/>
-          <a:p>
-            <a:pPr algn="ctr"/>
-            <a:r>
-              <a:rPr lang="en-US" altLang="ko-KR" dirty="0" smtClean="0"/>
-              <a:t>5</a:t>
-            </a:r>
-            <a:endParaRPr lang="ko-KR" altLang="en-US" dirty="0"/>
-          </a:p>
-        </p:txBody>
-      </p:sp>
     </p:spTree>
     <p:extLst>
       <p:ext uri="{BB962C8B-B14F-4D97-AF65-F5344CB8AC3E}">
-        <p14:creationId xmlns="" xmlns:p14="http://schemas.microsoft.com/office/powerpoint/2010/main" val="302657218"/>
+        <p14:creationId xmlns:p14="http://schemas.microsoft.com/office/powerpoint/2010/main" xmlns="" val="302657218"/>
       </p:ext>
     </p:extLst>
   </p:cSld>
@@ -17734,291 +17125,8 @@
   <a:extraClrSchemeLst/>
   <a:extLst>
     <a:ext uri="{05A4C25C-085E-4340-85A3-A5531E510DB2}">
-      <thm15:themeFamily xmlns="" xmlns:thm15="http://schemas.microsoft.com/office/thememl/2012/main" name="Office Theme" id="{62F939B6-93AF-4DB8-9C6B-D6C7DFDC589F}" vid="{4A3C46E8-61CC-4603-A589-7422A47A8E4A}"/>
+      <thm15:themeFamily xmlns:thm15="http://schemas.microsoft.com/office/thememl/2012/main" xmlns="" name="Office Theme" id="{62F939B6-93AF-4DB8-9C6B-D6C7DFDC589F}" vid="{4A3C46E8-61CC-4603-A589-7422A47A8E4A}"/>
     </a:ext>
   </a:extLst>
 </a:theme>
-</file>
-
-<file path=ppt/theme/theme2.xml><?xml version="1.0" encoding="utf-8"?>
-<a:theme xmlns:a="http://schemas.openxmlformats.org/drawingml/2006/main" name="Office 테마">
-  <a:themeElements>
-    <a:clrScheme name="Office">
-      <a:dk1>
-        <a:sysClr val="windowText" lastClr="000000"/>
-      </a:dk1>
-      <a:lt1>
-        <a:sysClr val="window" lastClr="FFFFFF"/>
-      </a:lt1>
-      <a:dk2>
-        <a:srgbClr val="1F497D"/>
-      </a:dk2>
-      <a:lt2>
-        <a:srgbClr val="EEECE1"/>
-      </a:lt2>
-      <a:accent1>
-        <a:srgbClr val="4F81BD"/>
-      </a:accent1>
-      <a:accent2>
-        <a:srgbClr val="C0504D"/>
-      </a:accent2>
-      <a:accent3>
-        <a:srgbClr val="9BBB59"/>
-      </a:accent3>
-      <a:accent4>
-        <a:srgbClr val="8064A2"/>
-      </a:accent4>
-      <a:accent5>
-        <a:srgbClr val="4BACC6"/>
-      </a:accent5>
-      <a:accent6>
-        <a:srgbClr val="F79646"/>
-      </a:accent6>
-      <a:hlink>
-        <a:srgbClr val="0000FF"/>
-      </a:hlink>
-      <a:folHlink>
-        <a:srgbClr val="800080"/>
-      </a:folHlink>
-    </a:clrScheme>
-    <a:fontScheme name="Office">
-      <a:majorFont>
-        <a:latin typeface="맑은 고딕"/>
-        <a:ea typeface=""/>
-        <a:cs typeface=""/>
-        <a:font script="Jpan" typeface="ＭＳ Ｐゴシック"/>
-        <a:font script="Hang" typeface="맑은 고딕"/>
-        <a:font script="Hans" typeface="宋体"/>
-        <a:font script="Hant" typeface="新細明體"/>
-        <a:font script="Arab" typeface="Times New Roman"/>
-        <a:font script="Hebr" typeface="Times New Roman"/>
-        <a:font script="Thai" typeface="Angsana New"/>
-        <a:font script="Ethi" typeface="Nyala"/>
-        <a:font script="Beng" typeface="Vrinda"/>
-        <a:font script="Gujr" typeface="Shruti"/>
-        <a:font script="Khmr" typeface="MoolBoran"/>
-        <a:font script="Knda" typeface="Tunga"/>
-        <a:font script="Guru" typeface="Raavi"/>
-        <a:font script="Cans" typeface="Euphemia"/>
-        <a:font script="Cher" typeface="Plantagenet Cherokee"/>
-        <a:font script="Yiii" typeface="Microsoft Yi Baiti"/>
-        <a:font script="Tibt" typeface="Microsoft Himalaya"/>
-        <a:font script="Thaa" typeface="MV Boli"/>
-        <a:font script="Deva" typeface="Mangal"/>
-        <a:font script="Telu" typeface="Gautami"/>
-        <a:font script="Taml" typeface="Latha"/>
-        <a:font script="Syrc" typeface="Estrangelo Edessa"/>
-        <a:font script="Orya" typeface="Kalinga"/>
-        <a:font script="Mlym" typeface="Kartika"/>
-        <a:font script="Laoo" typeface="DokChampa"/>
-        <a:font script="Sinh" typeface="Iskoola Pota"/>
-        <a:font script="Mong" typeface="Mongolian Baiti"/>
-        <a:font script="Viet" typeface="Times New Roman"/>
-        <a:font script="Uigh" typeface="Microsoft Uighur"/>
-      </a:majorFont>
-      <a:minorFont>
-        <a:latin typeface="맑은 고딕"/>
-        <a:ea typeface=""/>
-        <a:cs typeface=""/>
-        <a:font script="Jpan" typeface="ＭＳ Ｐゴシック"/>
-        <a:font script="Hang" typeface="맑은 고딕"/>
-        <a:font script="Hans" typeface="宋体"/>
-        <a:font script="Hant" typeface="新細明體"/>
-        <a:font script="Arab" typeface="Arial"/>
-        <a:font script="Hebr" typeface="Arial"/>
-        <a:font script="Thai" typeface="Cordia New"/>
-        <a:font script="Ethi" typeface="Nyala"/>
-        <a:font script="Beng" typeface="Vrinda"/>
-        <a:font script="Gujr" typeface="Shruti"/>
-        <a:font script="Khmr" typeface="DaunPenh"/>
-        <a:font script="Knda" typeface="Tunga"/>
-        <a:font script="Guru" typeface="Raavi"/>
-        <a:font script="Cans" typeface="Euphemia"/>
-        <a:font script="Cher" typeface="Plantagenet Cherokee"/>
-        <a:font script="Yiii" typeface="Microsoft Yi Baiti"/>
-        <a:font script="Tibt" typeface="Microsoft Himalaya"/>
-        <a:font script="Thaa" typeface="MV Boli"/>
-        <a:font script="Deva" typeface="Mangal"/>
-        <a:font script="Telu" typeface="Gautami"/>
-        <a:font script="Taml" typeface="Latha"/>
-        <a:font script="Syrc" typeface="Estrangelo Edessa"/>
-        <a:font script="Orya" typeface="Kalinga"/>
-        <a:font script="Mlym" typeface="Kartika"/>
-        <a:font script="Laoo" typeface="DokChampa"/>
-        <a:font script="Sinh" typeface="Iskoola Pota"/>
-        <a:font script="Mong" typeface="Mongolian Baiti"/>
-        <a:font script="Viet" typeface="Arial"/>
-        <a:font script="Uigh" typeface="Microsoft Uighur"/>
-      </a:minorFont>
-    </a:fontScheme>
-    <a:fmtScheme name="Office">
-      <a:fillStyleLst>
-        <a:solidFill>
-          <a:schemeClr val="phClr"/>
-        </a:solidFill>
-        <a:gradFill rotWithShape="1">
-          <a:gsLst>
-            <a:gs pos="0">
-              <a:schemeClr val="phClr">
-                <a:tint val="50000"/>
-                <a:satMod val="300000"/>
-              </a:schemeClr>
-            </a:gs>
-            <a:gs pos="35000">
-              <a:schemeClr val="phClr">
-                <a:tint val="37000"/>
-                <a:satMod val="300000"/>
-              </a:schemeClr>
-            </a:gs>
-            <a:gs pos="100000">
-              <a:schemeClr val="phClr">
-                <a:tint val="15000"/>
-                <a:satMod val="350000"/>
-              </a:schemeClr>
-            </a:gs>
-          </a:gsLst>
-          <a:lin ang="16200000" scaled="1"/>
-        </a:gradFill>
-        <a:gradFill rotWithShape="1">
-          <a:gsLst>
-            <a:gs pos="0">
-              <a:schemeClr val="phClr">
-                <a:shade val="51000"/>
-                <a:satMod val="130000"/>
-              </a:schemeClr>
-            </a:gs>
-            <a:gs pos="80000">
-              <a:schemeClr val="phClr">
-                <a:shade val="93000"/>
-                <a:satMod val="130000"/>
-              </a:schemeClr>
-            </a:gs>
-            <a:gs pos="100000">
-              <a:schemeClr val="phClr">
-                <a:shade val="94000"/>
-                <a:satMod val="135000"/>
-              </a:schemeClr>
-            </a:gs>
-          </a:gsLst>
-          <a:lin ang="16200000" scaled="0"/>
-        </a:gradFill>
-      </a:fillStyleLst>
-      <a:lnStyleLst>
-        <a:ln w="9525" cap="flat" cmpd="sng" algn="ctr">
-          <a:solidFill>
-            <a:schemeClr val="phClr">
-              <a:shade val="95000"/>
-              <a:satMod val="105000"/>
-            </a:schemeClr>
-          </a:solidFill>
-          <a:prstDash val="solid"/>
-        </a:ln>
-        <a:ln w="25400" cap="flat" cmpd="sng" algn="ctr">
-          <a:solidFill>
-            <a:schemeClr val="phClr"/>
-          </a:solidFill>
-          <a:prstDash val="solid"/>
-        </a:ln>
-        <a:ln w="38100" cap="flat" cmpd="sng" algn="ctr">
-          <a:solidFill>
-            <a:schemeClr val="phClr"/>
-          </a:solidFill>
-          <a:prstDash val="solid"/>
-        </a:ln>
-      </a:lnStyleLst>
-      <a:effectStyleLst>
-        <a:effectStyle>
-          <a:effectLst>
-            <a:outerShdw blurRad="40000" dist="20000" dir="5400000" rotWithShape="0">
-              <a:srgbClr val="000000">
-                <a:alpha val="38000"/>
-              </a:srgbClr>
-            </a:outerShdw>
-          </a:effectLst>
-        </a:effectStyle>
-        <a:effectStyle>
-          <a:effectLst>
-            <a:outerShdw blurRad="40000" dist="23000" dir="5400000" rotWithShape="0">
-              <a:srgbClr val="000000">
-                <a:alpha val="35000"/>
-              </a:srgbClr>
-            </a:outerShdw>
-          </a:effectLst>
-        </a:effectStyle>
-        <a:effectStyle>
-          <a:effectLst>
-            <a:outerShdw blurRad="40000" dist="23000" dir="5400000" rotWithShape="0">
-              <a:srgbClr val="000000">
-                <a:alpha val="35000"/>
-              </a:srgbClr>
-            </a:outerShdw>
-          </a:effectLst>
-          <a:scene3d>
-            <a:camera prst="orthographicFront">
-              <a:rot lat="0" lon="0" rev="0"/>
-            </a:camera>
-            <a:lightRig rig="threePt" dir="t">
-              <a:rot lat="0" lon="0" rev="1200000"/>
-            </a:lightRig>
-          </a:scene3d>
-          <a:sp3d>
-            <a:bevelT w="63500" h="25400"/>
-          </a:sp3d>
-        </a:effectStyle>
-      </a:effectStyleLst>
-      <a:bgFillStyleLst>
-        <a:solidFill>
-          <a:schemeClr val="phClr"/>
-        </a:solidFill>
-        <a:gradFill rotWithShape="1">
-          <a:gsLst>
-            <a:gs pos="0">
-              <a:schemeClr val="phClr">
-                <a:tint val="40000"/>
-                <a:satMod val="350000"/>
-              </a:schemeClr>
-            </a:gs>
-            <a:gs pos="40000">
-              <a:schemeClr val="phClr">
-                <a:tint val="45000"/>
-                <a:shade val="99000"/>
-                <a:satMod val="350000"/>
-              </a:schemeClr>
-            </a:gs>
-            <a:gs pos="100000">
-              <a:schemeClr val="phClr">
-                <a:shade val="20000"/>
-                <a:satMod val="255000"/>
-              </a:schemeClr>
-            </a:gs>
-          </a:gsLst>
-          <a:path path="circle">
-            <a:fillToRect l="50000" t="-80000" r="50000" b="180000"/>
-          </a:path>
-        </a:gradFill>
-        <a:gradFill rotWithShape="1">
-          <a:gsLst>
-            <a:gs pos="0">
-              <a:schemeClr val="phClr">
-                <a:tint val="80000"/>
-                <a:satMod val="300000"/>
-              </a:schemeClr>
-            </a:gs>
-            <a:gs pos="100000">
-              <a:schemeClr val="phClr">
-                <a:shade val="30000"/>
-                <a:satMod val="200000"/>
-              </a:schemeClr>
-            </a:gs>
-          </a:gsLst>
-          <a:path path="circle">
-            <a:fillToRect l="50000" t="50000" r="50000" b="50000"/>
-          </a:path>
-        </a:gradFill>
-      </a:bgFillStyleLst>
-    </a:fmtScheme>
-  </a:themeElements>
-  <a:objectDefaults/>
-  <a:extraClrSchemeLst/>
-</a:theme>
 </file>
</xml_diff>